<commit_message>
Add components to homescreen
</commit_message>
<xml_diff>
--- a/Angular2.pptx
+++ b/Angular2.pptx
@@ -5,7 +5,7 @@
     <p:sldMasterId id="2147483648" r:id="rId1"/>
   </p:sldMasterIdLst>
   <p:notesMasterIdLst>
-    <p:notesMasterId r:id="rId55"/>
+    <p:notesMasterId r:id="rId67"/>
   </p:notesMasterIdLst>
   <p:sldIdLst>
     <p:sldId id="256" r:id="rId2"/>
@@ -61,6 +61,18 @@
     <p:sldId id="314" r:id="rId52"/>
     <p:sldId id="313" r:id="rId53"/>
     <p:sldId id="315" r:id="rId54"/>
+    <p:sldId id="316" r:id="rId55"/>
+    <p:sldId id="319" r:id="rId56"/>
+    <p:sldId id="320" r:id="rId57"/>
+    <p:sldId id="321" r:id="rId58"/>
+    <p:sldId id="322" r:id="rId59"/>
+    <p:sldId id="318" r:id="rId60"/>
+    <p:sldId id="323" r:id="rId61"/>
+    <p:sldId id="317" r:id="rId62"/>
+    <p:sldId id="324" r:id="rId63"/>
+    <p:sldId id="325" r:id="rId64"/>
+    <p:sldId id="326" r:id="rId65"/>
+    <p:sldId id="327" r:id="rId66"/>
   </p:sldIdLst>
   <p:sldSz cx="12192000" cy="6858000"/>
   <p:notesSz cx="6858000" cy="9144000"/>
@@ -20054,13 +20066,22 @@
               <a:t>btn</a:t>
             </a:r>
             <a:r>
-              <a:rPr lang="en-US" dirty="0">
+              <a:rPr lang="en-US">
                 <a:solidFill>
                   <a:schemeClr val="accent6"/>
                 </a:solidFill>
                 <a:latin typeface="Consolas" panose="020B0609020204030204" pitchFamily="49" charset="0"/>
               </a:rPr>
-              <a:t>-delete" (click)="delete(</a:t>
+              <a:t>-danger" </a:t>
+            </a:r>
+            <a:r>
+              <a:rPr lang="en-US" dirty="0">
+                <a:solidFill>
+                  <a:schemeClr val="accent6"/>
+                </a:solidFill>
+                <a:latin typeface="Consolas" panose="020B0609020204030204" pitchFamily="49" charset="0"/>
+              </a:rPr>
+              <a:t>(click)="delete(</a:t>
             </a:r>
             <a:r>
               <a:rPr lang="en-US" dirty="0" err="1">
@@ -21539,6 +21560,1360 @@
 </p:sld>
 </file>
 
+<file path=ppt/slides/slide54.xml><?xml version="1.0" encoding="utf-8"?>
+<p:sld xmlns:a="http://schemas.openxmlformats.org/drawingml/2006/main" xmlns:r="http://schemas.openxmlformats.org/officeDocument/2006/relationships" xmlns:p="http://schemas.openxmlformats.org/presentationml/2006/main">
+  <p:cSld>
+    <p:spTree>
+      <p:nvGrpSpPr>
+        <p:cNvPr id="1" name=""/>
+        <p:cNvGrpSpPr/>
+        <p:nvPr/>
+      </p:nvGrpSpPr>
+      <p:grpSpPr>
+        <a:xfrm>
+          <a:off x="0" y="0"/>
+          <a:ext cx="0" cy="0"/>
+          <a:chOff x="0" y="0"/>
+          <a:chExt cx="0" cy="0"/>
+        </a:xfrm>
+      </p:grpSpPr>
+      <p:sp>
+        <p:nvSpPr>
+          <p:cNvPr id="2" name="Title 1">
+            <a:extLst>
+              <a:ext uri="{FF2B5EF4-FFF2-40B4-BE49-F238E27FC236}">
+                <a16:creationId xmlns:a16="http://schemas.microsoft.com/office/drawing/2014/main" id="{195FD8C3-2932-4348-B980-3FA578B379A7}"/>
+              </a:ext>
+            </a:extLst>
+          </p:cNvPr>
+          <p:cNvSpPr>
+            <a:spLocks noGrp="1"/>
+          </p:cNvSpPr>
+          <p:nvPr>
+            <p:ph type="title"/>
+          </p:nvPr>
+        </p:nvSpPr>
+        <p:spPr/>
+        <p:txBody>
+          <a:bodyPr/>
+          <a:lstStyle/>
+          <a:p>
+            <a:r>
+              <a:rPr lang="en-US" dirty="0"/>
+              <a:t>BLA </a:t>
+            </a:r>
+            <a:r>
+              <a:rPr lang="en-US" dirty="0" err="1"/>
+              <a:t>BLA</a:t>
+            </a:r>
+            <a:r>
+              <a:rPr lang="en-US" dirty="0"/>
+              <a:t>	</a:t>
+            </a:r>
+            <a:endParaRPr lang="en-NL" dirty="0"/>
+          </a:p>
+        </p:txBody>
+      </p:sp>
+      <p:sp>
+        <p:nvSpPr>
+          <p:cNvPr id="3" name="Content Placeholder 2">
+            <a:extLst>
+              <a:ext uri="{FF2B5EF4-FFF2-40B4-BE49-F238E27FC236}">
+                <a16:creationId xmlns:a16="http://schemas.microsoft.com/office/drawing/2014/main" id="{0DE9D5BB-2491-4C6C-9B59-766A9FDF574D}"/>
+              </a:ext>
+            </a:extLst>
+          </p:cNvPr>
+          <p:cNvSpPr>
+            <a:spLocks noGrp="1"/>
+          </p:cNvSpPr>
+          <p:nvPr>
+            <p:ph idx="1"/>
+          </p:nvPr>
+        </p:nvSpPr>
+        <p:spPr/>
+        <p:txBody>
+          <a:bodyPr/>
+          <a:lstStyle/>
+          <a:p>
+            <a:r>
+              <a:rPr lang="en-US" dirty="0"/>
+              <a:t>Create </a:t>
+            </a:r>
+            <a:r>
+              <a:rPr lang="en-US" dirty="0" err="1"/>
+              <a:t>homecomponent</a:t>
+            </a:r>
+            <a:endParaRPr lang="en-NL" dirty="0"/>
+          </a:p>
+        </p:txBody>
+      </p:sp>
+    </p:spTree>
+    <p:extLst>
+      <p:ext uri="{BB962C8B-B14F-4D97-AF65-F5344CB8AC3E}">
+        <p14:creationId xmlns:p14="http://schemas.microsoft.com/office/powerpoint/2010/main" val="1342114192"/>
+      </p:ext>
+    </p:extLst>
+  </p:cSld>
+  <p:clrMapOvr>
+    <a:masterClrMapping/>
+  </p:clrMapOvr>
+</p:sld>
+</file>
+
+<file path=ppt/slides/slide55.xml><?xml version="1.0" encoding="utf-8"?>
+<p:sld xmlns:a="http://schemas.openxmlformats.org/drawingml/2006/main" xmlns:r="http://schemas.openxmlformats.org/officeDocument/2006/relationships" xmlns:p="http://schemas.openxmlformats.org/presentationml/2006/main">
+  <p:cSld>
+    <p:spTree>
+      <p:nvGrpSpPr>
+        <p:cNvPr id="1" name=""/>
+        <p:cNvGrpSpPr/>
+        <p:nvPr/>
+      </p:nvGrpSpPr>
+      <p:grpSpPr>
+        <a:xfrm>
+          <a:off x="0" y="0"/>
+          <a:ext cx="0" cy="0"/>
+          <a:chOff x="0" y="0"/>
+          <a:chExt cx="0" cy="0"/>
+        </a:xfrm>
+      </p:grpSpPr>
+      <p:sp>
+        <p:nvSpPr>
+          <p:cNvPr id="2" name="Title 1">
+            <a:extLst>
+              <a:ext uri="{FF2B5EF4-FFF2-40B4-BE49-F238E27FC236}">
+                <a16:creationId xmlns:a16="http://schemas.microsoft.com/office/drawing/2014/main" id="{9A64E705-BDA7-4BB6-9694-05EDEF6B8B3E}"/>
+              </a:ext>
+            </a:extLst>
+          </p:cNvPr>
+          <p:cNvSpPr>
+            <a:spLocks noGrp="1"/>
+          </p:cNvSpPr>
+          <p:nvPr>
+            <p:ph type="title"/>
+          </p:nvPr>
+        </p:nvSpPr>
+        <p:spPr/>
+        <p:txBody>
+          <a:bodyPr/>
+          <a:lstStyle/>
+          <a:p>
+            <a:endParaRPr lang="en-NL"/>
+          </a:p>
+        </p:txBody>
+      </p:sp>
+      <p:sp>
+        <p:nvSpPr>
+          <p:cNvPr id="3" name="Content Placeholder 2">
+            <a:extLst>
+              <a:ext uri="{FF2B5EF4-FFF2-40B4-BE49-F238E27FC236}">
+                <a16:creationId xmlns:a16="http://schemas.microsoft.com/office/drawing/2014/main" id="{40AE36F2-7DFA-4E50-9DE2-BE9A4E6E12ED}"/>
+              </a:ext>
+            </a:extLst>
+          </p:cNvPr>
+          <p:cNvSpPr>
+            <a:spLocks noGrp="1"/>
+          </p:cNvSpPr>
+          <p:nvPr>
+            <p:ph idx="1"/>
+          </p:nvPr>
+        </p:nvSpPr>
+        <p:spPr/>
+        <p:txBody>
+          <a:bodyPr/>
+          <a:lstStyle/>
+          <a:p>
+            <a:pPr marL="0" indent="0">
+              <a:buNone/>
+            </a:pPr>
+            <a:endParaRPr lang="en-NL" dirty="0"/>
+          </a:p>
+        </p:txBody>
+      </p:sp>
+    </p:spTree>
+    <p:extLst>
+      <p:ext uri="{BB962C8B-B14F-4D97-AF65-F5344CB8AC3E}">
+        <p14:creationId xmlns:p14="http://schemas.microsoft.com/office/powerpoint/2010/main" val="1259476081"/>
+      </p:ext>
+    </p:extLst>
+  </p:cSld>
+  <p:clrMapOvr>
+    <a:masterClrMapping/>
+  </p:clrMapOvr>
+</p:sld>
+</file>
+
+<file path=ppt/slides/slide56.xml><?xml version="1.0" encoding="utf-8"?>
+<p:sld xmlns:a="http://schemas.openxmlformats.org/drawingml/2006/main" xmlns:r="http://schemas.openxmlformats.org/officeDocument/2006/relationships" xmlns:p="http://schemas.openxmlformats.org/presentationml/2006/main">
+  <p:cSld>
+    <p:spTree>
+      <p:nvGrpSpPr>
+        <p:cNvPr id="1" name=""/>
+        <p:cNvGrpSpPr/>
+        <p:nvPr/>
+      </p:nvGrpSpPr>
+      <p:grpSpPr>
+        <a:xfrm>
+          <a:off x="0" y="0"/>
+          <a:ext cx="0" cy="0"/>
+          <a:chOff x="0" y="0"/>
+          <a:chExt cx="0" cy="0"/>
+        </a:xfrm>
+      </p:grpSpPr>
+      <p:sp>
+        <p:nvSpPr>
+          <p:cNvPr id="2" name="Title 1">
+            <a:extLst>
+              <a:ext uri="{FF2B5EF4-FFF2-40B4-BE49-F238E27FC236}">
+                <a16:creationId xmlns:a16="http://schemas.microsoft.com/office/drawing/2014/main" id="{45182E92-06EC-4809-8179-43828597BB68}"/>
+              </a:ext>
+            </a:extLst>
+          </p:cNvPr>
+          <p:cNvSpPr>
+            <a:spLocks noGrp="1"/>
+          </p:cNvSpPr>
+          <p:nvPr>
+            <p:ph type="title"/>
+          </p:nvPr>
+        </p:nvSpPr>
+        <p:spPr/>
+        <p:txBody>
+          <a:bodyPr/>
+          <a:lstStyle/>
+          <a:p>
+            <a:r>
+              <a:rPr lang="en-US" dirty="0" err="1"/>
+              <a:t>cmd</a:t>
+            </a:r>
+            <a:endParaRPr lang="en-NL" dirty="0"/>
+          </a:p>
+        </p:txBody>
+      </p:sp>
+      <p:sp>
+        <p:nvSpPr>
+          <p:cNvPr id="3" name="Content Placeholder 2">
+            <a:extLst>
+              <a:ext uri="{FF2B5EF4-FFF2-40B4-BE49-F238E27FC236}">
+                <a16:creationId xmlns:a16="http://schemas.microsoft.com/office/drawing/2014/main" id="{D1C90A54-BF10-4871-86E3-A39093C29941}"/>
+              </a:ext>
+            </a:extLst>
+          </p:cNvPr>
+          <p:cNvSpPr>
+            <a:spLocks noGrp="1"/>
+          </p:cNvSpPr>
+          <p:nvPr>
+            <p:ph idx="1"/>
+          </p:nvPr>
+        </p:nvSpPr>
+        <p:spPr/>
+        <p:style>
+          <a:lnRef idx="2">
+            <a:schemeClr val="dk1">
+              <a:shade val="50000"/>
+            </a:schemeClr>
+          </a:lnRef>
+          <a:fillRef idx="1">
+            <a:schemeClr val="dk1"/>
+          </a:fillRef>
+          <a:effectRef idx="0">
+            <a:schemeClr val="dk1"/>
+          </a:effectRef>
+          <a:fontRef idx="minor">
+            <a:schemeClr val="lt1"/>
+          </a:fontRef>
+        </p:style>
+        <p:txBody>
+          <a:bodyPr/>
+          <a:lstStyle/>
+          <a:p>
+            <a:pPr marL="0" indent="0">
+              <a:buNone/>
+            </a:pPr>
+            <a:r>
+              <a:rPr lang="en-US" dirty="0"/>
+              <a:t>&gt; ng g component home</a:t>
+            </a:r>
+            <a:endParaRPr lang="en-NL" dirty="0"/>
+          </a:p>
+        </p:txBody>
+      </p:sp>
+    </p:spTree>
+    <p:extLst>
+      <p:ext uri="{BB962C8B-B14F-4D97-AF65-F5344CB8AC3E}">
+        <p14:creationId xmlns:p14="http://schemas.microsoft.com/office/powerpoint/2010/main" val="1321668897"/>
+      </p:ext>
+    </p:extLst>
+  </p:cSld>
+  <p:clrMapOvr>
+    <a:masterClrMapping/>
+  </p:clrMapOvr>
+</p:sld>
+</file>
+
+<file path=ppt/slides/slide57.xml><?xml version="1.0" encoding="utf-8"?>
+<p:sld xmlns:a="http://schemas.openxmlformats.org/drawingml/2006/main" xmlns:r="http://schemas.openxmlformats.org/officeDocument/2006/relationships" xmlns:p="http://schemas.openxmlformats.org/presentationml/2006/main">
+  <p:cSld>
+    <p:spTree>
+      <p:nvGrpSpPr>
+        <p:cNvPr id="1" name=""/>
+        <p:cNvGrpSpPr/>
+        <p:nvPr/>
+      </p:nvGrpSpPr>
+      <p:grpSpPr>
+        <a:xfrm>
+          <a:off x="0" y="0"/>
+          <a:ext cx="0" cy="0"/>
+          <a:chOff x="0" y="0"/>
+          <a:chExt cx="0" cy="0"/>
+        </a:xfrm>
+      </p:grpSpPr>
+      <p:sp>
+        <p:nvSpPr>
+          <p:cNvPr id="2" name="Title 1">
+            <a:extLst>
+              <a:ext uri="{FF2B5EF4-FFF2-40B4-BE49-F238E27FC236}">
+                <a16:creationId xmlns:a16="http://schemas.microsoft.com/office/drawing/2014/main" id="{E47D320D-A223-44FB-A14D-14D7AB2DBCF6}"/>
+              </a:ext>
+            </a:extLst>
+          </p:cNvPr>
+          <p:cNvSpPr>
+            <a:spLocks noGrp="1"/>
+          </p:cNvSpPr>
+          <p:nvPr>
+            <p:ph type="title"/>
+          </p:nvPr>
+        </p:nvSpPr>
+        <p:spPr/>
+        <p:txBody>
+          <a:bodyPr/>
+          <a:lstStyle/>
+          <a:p>
+            <a:r>
+              <a:rPr lang="en-US" dirty="0" err="1"/>
+              <a:t>app.routing.module.ts</a:t>
+            </a:r>
+            <a:endParaRPr lang="en-NL" dirty="0"/>
+          </a:p>
+        </p:txBody>
+      </p:sp>
+      <p:sp>
+        <p:nvSpPr>
+          <p:cNvPr id="3" name="Content Placeholder 2">
+            <a:extLst>
+              <a:ext uri="{FF2B5EF4-FFF2-40B4-BE49-F238E27FC236}">
+                <a16:creationId xmlns:a16="http://schemas.microsoft.com/office/drawing/2014/main" id="{FC525FEB-DD0E-49FB-AE1F-569BCC159736}"/>
+              </a:ext>
+            </a:extLst>
+          </p:cNvPr>
+          <p:cNvSpPr>
+            <a:spLocks noGrp="1"/>
+          </p:cNvSpPr>
+          <p:nvPr>
+            <p:ph idx="1"/>
+          </p:nvPr>
+        </p:nvSpPr>
+        <p:spPr/>
+        <p:style>
+          <a:lnRef idx="0">
+            <a:scrgbClr r="0" g="0" b="0"/>
+          </a:lnRef>
+          <a:fillRef idx="1001">
+            <a:schemeClr val="dk2"/>
+          </a:fillRef>
+          <a:effectRef idx="0">
+            <a:scrgbClr r="0" g="0" b="0"/>
+          </a:effectRef>
+          <a:fontRef idx="major"/>
+        </p:style>
+        <p:txBody>
+          <a:bodyPr/>
+          <a:lstStyle/>
+          <a:p>
+            <a:pPr marL="0" indent="0">
+              <a:buNone/>
+            </a:pPr>
+            <a:r>
+              <a:rPr lang="en-US" dirty="0" err="1">
+                <a:solidFill>
+                  <a:srgbClr val="569CD6"/>
+                </a:solidFill>
+                <a:latin typeface="Consolas" panose="020B0609020204030204" pitchFamily="49" charset="0"/>
+              </a:rPr>
+              <a:t>const</a:t>
+            </a:r>
+            <a:r>
+              <a:rPr lang="en-US" dirty="0">
+                <a:solidFill>
+                  <a:srgbClr val="D4D4D4"/>
+                </a:solidFill>
+                <a:latin typeface="Consolas" panose="020B0609020204030204" pitchFamily="49" charset="0"/>
+              </a:rPr>
+              <a:t> </a:t>
+            </a:r>
+            <a:r>
+              <a:rPr lang="en-US" dirty="0">
+                <a:solidFill>
+                  <a:srgbClr val="9CDCFE"/>
+                </a:solidFill>
+                <a:latin typeface="Consolas" panose="020B0609020204030204" pitchFamily="49" charset="0"/>
+              </a:rPr>
+              <a:t>routes</a:t>
+            </a:r>
+            <a:r>
+              <a:rPr lang="en-US" dirty="0">
+                <a:solidFill>
+                  <a:srgbClr val="D4D4D4"/>
+                </a:solidFill>
+                <a:latin typeface="Consolas" panose="020B0609020204030204" pitchFamily="49" charset="0"/>
+              </a:rPr>
+              <a:t>: </a:t>
+            </a:r>
+            <a:r>
+              <a:rPr lang="en-US" dirty="0">
+                <a:solidFill>
+                  <a:srgbClr val="4EC9B0"/>
+                </a:solidFill>
+                <a:latin typeface="Consolas" panose="020B0609020204030204" pitchFamily="49" charset="0"/>
+              </a:rPr>
+              <a:t>Routes</a:t>
+            </a:r>
+            <a:r>
+              <a:rPr lang="en-US" dirty="0">
+                <a:solidFill>
+                  <a:srgbClr val="D4D4D4"/>
+                </a:solidFill>
+                <a:latin typeface="Consolas" panose="020B0609020204030204" pitchFamily="49" charset="0"/>
+              </a:rPr>
+              <a:t> = [</a:t>
+            </a:r>
+          </a:p>
+          <a:p>
+            <a:pPr marL="457200" lvl="1" indent="0">
+              <a:buNone/>
+            </a:pPr>
+            <a:r>
+              <a:rPr lang="en-US" dirty="0">
+                <a:solidFill>
+                  <a:srgbClr val="D4D4D4"/>
+                </a:solidFill>
+                <a:latin typeface="Consolas" panose="020B0609020204030204" pitchFamily="49" charset="0"/>
+              </a:rPr>
+              <a:t>{</a:t>
+            </a:r>
+            <a:r>
+              <a:rPr lang="en-US" dirty="0">
+                <a:solidFill>
+                  <a:srgbClr val="9CDCFE"/>
+                </a:solidFill>
+                <a:latin typeface="Consolas" panose="020B0609020204030204" pitchFamily="49" charset="0"/>
+              </a:rPr>
+              <a:t>path:</a:t>
+            </a:r>
+            <a:r>
+              <a:rPr lang="en-US" dirty="0">
+                <a:solidFill>
+                  <a:srgbClr val="D4D4D4"/>
+                </a:solidFill>
+                <a:latin typeface="Consolas" panose="020B0609020204030204" pitchFamily="49" charset="0"/>
+              </a:rPr>
+              <a:t> </a:t>
+            </a:r>
+            <a:r>
+              <a:rPr lang="en-US" dirty="0">
+                <a:solidFill>
+                  <a:srgbClr val="CE9178"/>
+                </a:solidFill>
+                <a:latin typeface="Consolas" panose="020B0609020204030204" pitchFamily="49" charset="0"/>
+              </a:rPr>
+              <a:t>''</a:t>
+            </a:r>
+            <a:r>
+              <a:rPr lang="en-US" dirty="0">
+                <a:solidFill>
+                  <a:srgbClr val="D4D4D4"/>
+                </a:solidFill>
+                <a:latin typeface="Consolas" panose="020B0609020204030204" pitchFamily="49" charset="0"/>
+              </a:rPr>
+              <a:t>, </a:t>
+            </a:r>
+            <a:r>
+              <a:rPr lang="en-US" dirty="0">
+                <a:solidFill>
+                  <a:srgbClr val="9CDCFE"/>
+                </a:solidFill>
+                <a:latin typeface="Consolas" panose="020B0609020204030204" pitchFamily="49" charset="0"/>
+              </a:rPr>
+              <a:t>component:</a:t>
+            </a:r>
+            <a:r>
+              <a:rPr lang="en-US" dirty="0">
+                <a:solidFill>
+                  <a:srgbClr val="D4D4D4"/>
+                </a:solidFill>
+                <a:latin typeface="Consolas" panose="020B0609020204030204" pitchFamily="49" charset="0"/>
+              </a:rPr>
+              <a:t> </a:t>
+            </a:r>
+            <a:r>
+              <a:rPr lang="en-US" dirty="0" err="1">
+                <a:solidFill>
+                  <a:srgbClr val="9CDCFE"/>
+                </a:solidFill>
+                <a:latin typeface="Consolas" panose="020B0609020204030204" pitchFamily="49" charset="0"/>
+              </a:rPr>
+              <a:t>HomeComponent</a:t>
+            </a:r>
+            <a:r>
+              <a:rPr lang="en-US" dirty="0">
+                <a:solidFill>
+                  <a:srgbClr val="D4D4D4"/>
+                </a:solidFill>
+                <a:latin typeface="Consolas" panose="020B0609020204030204" pitchFamily="49" charset="0"/>
+              </a:rPr>
+              <a:t>},</a:t>
+            </a:r>
+          </a:p>
+          <a:p>
+            <a:pPr marL="457200" lvl="1" indent="0">
+              <a:buNone/>
+            </a:pPr>
+            <a:r>
+              <a:rPr lang="en-US" dirty="0">
+                <a:solidFill>
+                  <a:srgbClr val="D4D4D4"/>
+                </a:solidFill>
+                <a:latin typeface="Consolas" panose="020B0609020204030204" pitchFamily="49" charset="0"/>
+              </a:rPr>
+              <a:t>{</a:t>
+            </a:r>
+            <a:r>
+              <a:rPr lang="en-US" dirty="0">
+                <a:solidFill>
+                  <a:srgbClr val="9CDCFE"/>
+                </a:solidFill>
+                <a:latin typeface="Consolas" panose="020B0609020204030204" pitchFamily="49" charset="0"/>
+              </a:rPr>
+              <a:t>path:</a:t>
+            </a:r>
+            <a:r>
+              <a:rPr lang="en-US" dirty="0">
+                <a:solidFill>
+                  <a:srgbClr val="D4D4D4"/>
+                </a:solidFill>
+                <a:latin typeface="Consolas" panose="020B0609020204030204" pitchFamily="49" charset="0"/>
+              </a:rPr>
+              <a:t> </a:t>
+            </a:r>
+            <a:r>
+              <a:rPr lang="en-US" dirty="0">
+                <a:solidFill>
+                  <a:srgbClr val="CE9178"/>
+                </a:solidFill>
+                <a:latin typeface="Consolas" panose="020B0609020204030204" pitchFamily="49" charset="0"/>
+              </a:rPr>
+              <a:t>'create'</a:t>
+            </a:r>
+            <a:r>
+              <a:rPr lang="en-US" dirty="0">
+                <a:solidFill>
+                  <a:srgbClr val="D4D4D4"/>
+                </a:solidFill>
+                <a:latin typeface="Consolas" panose="020B0609020204030204" pitchFamily="49" charset="0"/>
+              </a:rPr>
+              <a:t>, </a:t>
+            </a:r>
+            <a:r>
+              <a:rPr lang="en-US" dirty="0">
+                <a:solidFill>
+                  <a:srgbClr val="9CDCFE"/>
+                </a:solidFill>
+                <a:latin typeface="Consolas" panose="020B0609020204030204" pitchFamily="49" charset="0"/>
+              </a:rPr>
+              <a:t>component:</a:t>
+            </a:r>
+            <a:r>
+              <a:rPr lang="en-US" dirty="0">
+                <a:solidFill>
+                  <a:srgbClr val="D4D4D4"/>
+                </a:solidFill>
+                <a:latin typeface="Consolas" panose="020B0609020204030204" pitchFamily="49" charset="0"/>
+              </a:rPr>
+              <a:t> </a:t>
+            </a:r>
+            <a:r>
+              <a:rPr lang="en-US" dirty="0" err="1">
+                <a:solidFill>
+                  <a:srgbClr val="9CDCFE"/>
+                </a:solidFill>
+                <a:latin typeface="Consolas" panose="020B0609020204030204" pitchFamily="49" charset="0"/>
+              </a:rPr>
+              <a:t>CreateTodoComponent</a:t>
+            </a:r>
+            <a:r>
+              <a:rPr lang="en-US" dirty="0">
+                <a:solidFill>
+                  <a:srgbClr val="D4D4D4"/>
+                </a:solidFill>
+                <a:latin typeface="Consolas" panose="020B0609020204030204" pitchFamily="49" charset="0"/>
+              </a:rPr>
+              <a:t>},</a:t>
+            </a:r>
+          </a:p>
+          <a:p>
+            <a:pPr marL="457200" lvl="1" indent="0">
+              <a:buNone/>
+            </a:pPr>
+            <a:r>
+              <a:rPr lang="en-US" dirty="0">
+                <a:solidFill>
+                  <a:srgbClr val="D4D4D4"/>
+                </a:solidFill>
+                <a:latin typeface="Consolas" panose="020B0609020204030204" pitchFamily="49" charset="0"/>
+              </a:rPr>
+              <a:t>{</a:t>
+            </a:r>
+            <a:r>
+              <a:rPr lang="en-US" dirty="0">
+                <a:solidFill>
+                  <a:srgbClr val="9CDCFE"/>
+                </a:solidFill>
+                <a:latin typeface="Consolas" panose="020B0609020204030204" pitchFamily="49" charset="0"/>
+              </a:rPr>
+              <a:t>path:</a:t>
+            </a:r>
+            <a:r>
+              <a:rPr lang="en-US" dirty="0">
+                <a:solidFill>
+                  <a:srgbClr val="D4D4D4"/>
+                </a:solidFill>
+                <a:latin typeface="Consolas" panose="020B0609020204030204" pitchFamily="49" charset="0"/>
+              </a:rPr>
+              <a:t> </a:t>
+            </a:r>
+            <a:r>
+              <a:rPr lang="en-US" dirty="0">
+                <a:solidFill>
+                  <a:srgbClr val="CE9178"/>
+                </a:solidFill>
+                <a:latin typeface="Consolas" panose="020B0609020204030204" pitchFamily="49" charset="0"/>
+              </a:rPr>
+              <a:t>'overview'</a:t>
+            </a:r>
+            <a:r>
+              <a:rPr lang="en-US" dirty="0">
+                <a:solidFill>
+                  <a:srgbClr val="D4D4D4"/>
+                </a:solidFill>
+                <a:latin typeface="Consolas" panose="020B0609020204030204" pitchFamily="49" charset="0"/>
+              </a:rPr>
+              <a:t>, </a:t>
+            </a:r>
+            <a:r>
+              <a:rPr lang="en-US" dirty="0">
+                <a:solidFill>
+                  <a:srgbClr val="9CDCFE"/>
+                </a:solidFill>
+                <a:latin typeface="Consolas" panose="020B0609020204030204" pitchFamily="49" charset="0"/>
+              </a:rPr>
+              <a:t>component:</a:t>
+            </a:r>
+            <a:r>
+              <a:rPr lang="en-US" dirty="0">
+                <a:solidFill>
+                  <a:srgbClr val="D4D4D4"/>
+                </a:solidFill>
+                <a:latin typeface="Consolas" panose="020B0609020204030204" pitchFamily="49" charset="0"/>
+              </a:rPr>
+              <a:t> </a:t>
+            </a:r>
+            <a:r>
+              <a:rPr lang="en-US" dirty="0" err="1">
+                <a:solidFill>
+                  <a:srgbClr val="9CDCFE"/>
+                </a:solidFill>
+                <a:latin typeface="Consolas" panose="020B0609020204030204" pitchFamily="49" charset="0"/>
+              </a:rPr>
+              <a:t>TodoOverviewComponent</a:t>
+            </a:r>
+            <a:r>
+              <a:rPr lang="en-US" dirty="0">
+                <a:solidFill>
+                  <a:srgbClr val="D4D4D4"/>
+                </a:solidFill>
+                <a:latin typeface="Consolas" panose="020B0609020204030204" pitchFamily="49" charset="0"/>
+              </a:rPr>
+              <a:t>},</a:t>
+            </a:r>
+          </a:p>
+          <a:p>
+            <a:pPr marL="457200" lvl="1" indent="0">
+              <a:buNone/>
+            </a:pPr>
+            <a:r>
+              <a:rPr lang="en-US" dirty="0">
+                <a:solidFill>
+                  <a:srgbClr val="D4D4D4"/>
+                </a:solidFill>
+                <a:latin typeface="Consolas" panose="020B0609020204030204" pitchFamily="49" charset="0"/>
+              </a:rPr>
+              <a:t>{</a:t>
+            </a:r>
+            <a:r>
+              <a:rPr lang="en-US" dirty="0">
+                <a:solidFill>
+                  <a:srgbClr val="9CDCFE"/>
+                </a:solidFill>
+                <a:latin typeface="Consolas" panose="020B0609020204030204" pitchFamily="49" charset="0"/>
+              </a:rPr>
+              <a:t>path:</a:t>
+            </a:r>
+            <a:r>
+              <a:rPr lang="en-US" dirty="0">
+                <a:solidFill>
+                  <a:srgbClr val="D4D4D4"/>
+                </a:solidFill>
+                <a:latin typeface="Consolas" panose="020B0609020204030204" pitchFamily="49" charset="0"/>
+              </a:rPr>
+              <a:t> </a:t>
+            </a:r>
+            <a:r>
+              <a:rPr lang="en-US" dirty="0">
+                <a:solidFill>
+                  <a:srgbClr val="CE9178"/>
+                </a:solidFill>
+                <a:latin typeface="Consolas" panose="020B0609020204030204" pitchFamily="49" charset="0"/>
+              </a:rPr>
+              <a:t>'**'</a:t>
+            </a:r>
+            <a:r>
+              <a:rPr lang="en-US" dirty="0">
+                <a:solidFill>
+                  <a:srgbClr val="D4D4D4"/>
+                </a:solidFill>
+                <a:latin typeface="Consolas" panose="020B0609020204030204" pitchFamily="49" charset="0"/>
+              </a:rPr>
+              <a:t>, </a:t>
+            </a:r>
+            <a:r>
+              <a:rPr lang="en-US" dirty="0">
+                <a:solidFill>
+                  <a:srgbClr val="9CDCFE"/>
+                </a:solidFill>
+                <a:latin typeface="Consolas" panose="020B0609020204030204" pitchFamily="49" charset="0"/>
+              </a:rPr>
+              <a:t>component:</a:t>
+            </a:r>
+            <a:r>
+              <a:rPr lang="en-US" dirty="0">
+                <a:solidFill>
+                  <a:srgbClr val="D4D4D4"/>
+                </a:solidFill>
+                <a:latin typeface="Consolas" panose="020B0609020204030204" pitchFamily="49" charset="0"/>
+              </a:rPr>
+              <a:t> </a:t>
+            </a:r>
+            <a:r>
+              <a:rPr lang="en-US" dirty="0" err="1">
+                <a:solidFill>
+                  <a:srgbClr val="9CDCFE"/>
+                </a:solidFill>
+                <a:latin typeface="Consolas" panose="020B0609020204030204" pitchFamily="49" charset="0"/>
+              </a:rPr>
+              <a:t>HomeComponent</a:t>
+            </a:r>
+            <a:r>
+              <a:rPr lang="en-US" dirty="0">
+                <a:solidFill>
+                  <a:srgbClr val="D4D4D4"/>
+                </a:solidFill>
+                <a:latin typeface="Consolas" panose="020B0609020204030204" pitchFamily="49" charset="0"/>
+              </a:rPr>
+              <a:t>},</a:t>
+            </a:r>
+          </a:p>
+          <a:p>
+            <a:pPr marL="0" indent="0">
+              <a:buNone/>
+            </a:pPr>
+            <a:r>
+              <a:rPr lang="en-US" dirty="0">
+                <a:solidFill>
+                  <a:srgbClr val="D4D4D4"/>
+                </a:solidFill>
+                <a:latin typeface="Consolas" panose="020B0609020204030204" pitchFamily="49" charset="0"/>
+              </a:rPr>
+              <a:t>];</a:t>
+            </a:r>
+          </a:p>
+          <a:p>
+            <a:pPr marL="0" indent="0">
+              <a:buNone/>
+            </a:pPr>
+            <a:endParaRPr lang="en-NL" dirty="0"/>
+          </a:p>
+        </p:txBody>
+      </p:sp>
+    </p:spTree>
+    <p:extLst>
+      <p:ext uri="{BB962C8B-B14F-4D97-AF65-F5344CB8AC3E}">
+        <p14:creationId xmlns:p14="http://schemas.microsoft.com/office/powerpoint/2010/main" val="1573746339"/>
+      </p:ext>
+    </p:extLst>
+  </p:cSld>
+  <p:clrMapOvr>
+    <a:masterClrMapping/>
+  </p:clrMapOvr>
+</p:sld>
+</file>
+
+<file path=ppt/slides/slide58.xml><?xml version="1.0" encoding="utf-8"?>
+<p:sld xmlns:a="http://schemas.openxmlformats.org/drawingml/2006/main" xmlns:r="http://schemas.openxmlformats.org/officeDocument/2006/relationships" xmlns:p="http://schemas.openxmlformats.org/presentationml/2006/main">
+  <p:cSld>
+    <p:spTree>
+      <p:nvGrpSpPr>
+        <p:cNvPr id="1" name=""/>
+        <p:cNvGrpSpPr/>
+        <p:nvPr/>
+      </p:nvGrpSpPr>
+      <p:grpSpPr>
+        <a:xfrm>
+          <a:off x="0" y="0"/>
+          <a:ext cx="0" cy="0"/>
+          <a:chOff x="0" y="0"/>
+          <a:chExt cx="0" cy="0"/>
+        </a:xfrm>
+      </p:grpSpPr>
+      <p:sp>
+        <p:nvSpPr>
+          <p:cNvPr id="2" name="Title 1">
+            <a:extLst>
+              <a:ext uri="{FF2B5EF4-FFF2-40B4-BE49-F238E27FC236}">
+                <a16:creationId xmlns:a16="http://schemas.microsoft.com/office/drawing/2014/main" id="{30210B52-12D6-4A02-95BA-DBA3C8D554FC}"/>
+              </a:ext>
+            </a:extLst>
+          </p:cNvPr>
+          <p:cNvSpPr>
+            <a:spLocks noGrp="1"/>
+          </p:cNvSpPr>
+          <p:nvPr>
+            <p:ph type="title"/>
+          </p:nvPr>
+        </p:nvSpPr>
+        <p:spPr/>
+        <p:txBody>
+          <a:bodyPr/>
+          <a:lstStyle/>
+          <a:p>
+            <a:r>
+              <a:rPr lang="en-US" dirty="0"/>
+              <a:t>app.component.html</a:t>
+            </a:r>
+            <a:endParaRPr lang="en-NL" dirty="0"/>
+          </a:p>
+        </p:txBody>
+      </p:sp>
+      <p:sp>
+        <p:nvSpPr>
+          <p:cNvPr id="3" name="Content Placeholder 2">
+            <a:extLst>
+              <a:ext uri="{FF2B5EF4-FFF2-40B4-BE49-F238E27FC236}">
+                <a16:creationId xmlns:a16="http://schemas.microsoft.com/office/drawing/2014/main" id="{8BECE808-0884-4F1F-893C-0DB29FE49B1C}"/>
+              </a:ext>
+            </a:extLst>
+          </p:cNvPr>
+          <p:cNvSpPr>
+            <a:spLocks noGrp="1"/>
+          </p:cNvSpPr>
+          <p:nvPr>
+            <p:ph idx="1"/>
+          </p:nvPr>
+        </p:nvSpPr>
+        <p:spPr/>
+        <p:style>
+          <a:lnRef idx="0">
+            <a:scrgbClr r="0" g="0" b="0"/>
+          </a:lnRef>
+          <a:fillRef idx="1001">
+            <a:schemeClr val="dk2"/>
+          </a:fillRef>
+          <a:effectRef idx="0">
+            <a:scrgbClr r="0" g="0" b="0"/>
+          </a:effectRef>
+          <a:fontRef idx="major"/>
+        </p:style>
+        <p:txBody>
+          <a:bodyPr/>
+          <a:lstStyle/>
+          <a:p>
+            <a:pPr marL="0" indent="0">
+              <a:buNone/>
+            </a:pPr>
+            <a:r>
+              <a:rPr lang="en-US" dirty="0">
+                <a:solidFill>
+                  <a:srgbClr val="808080"/>
+                </a:solidFill>
+                <a:latin typeface="Consolas" panose="020B0609020204030204" pitchFamily="49" charset="0"/>
+              </a:rPr>
+              <a:t>&lt;</a:t>
+            </a:r>
+            <a:r>
+              <a:rPr lang="en-US" dirty="0">
+                <a:solidFill>
+                  <a:srgbClr val="569CD6"/>
+                </a:solidFill>
+                <a:latin typeface="Consolas" panose="020B0609020204030204" pitchFamily="49" charset="0"/>
+              </a:rPr>
+              <a:t>li</a:t>
+            </a:r>
+            <a:r>
+              <a:rPr lang="en-US" dirty="0">
+                <a:solidFill>
+                  <a:srgbClr val="808080"/>
+                </a:solidFill>
+                <a:latin typeface="Consolas" panose="020B0609020204030204" pitchFamily="49" charset="0"/>
+              </a:rPr>
+              <a:t>&gt;</a:t>
+            </a:r>
+            <a:endParaRPr lang="en-US" dirty="0">
+              <a:solidFill>
+                <a:srgbClr val="D4D4D4"/>
+              </a:solidFill>
+              <a:latin typeface="Consolas" panose="020B0609020204030204" pitchFamily="49" charset="0"/>
+            </a:endParaRPr>
+          </a:p>
+          <a:p>
+            <a:pPr marL="0" indent="0">
+              <a:buNone/>
+            </a:pPr>
+            <a:r>
+              <a:rPr lang="en-US" dirty="0">
+                <a:solidFill>
+                  <a:srgbClr val="808080"/>
+                </a:solidFill>
+                <a:latin typeface="Consolas" panose="020B0609020204030204" pitchFamily="49" charset="0"/>
+              </a:rPr>
+              <a:t>	&lt;</a:t>
+            </a:r>
+            <a:r>
+              <a:rPr lang="en-US" dirty="0">
+                <a:solidFill>
+                  <a:srgbClr val="569CD6"/>
+                </a:solidFill>
+                <a:latin typeface="Consolas" panose="020B0609020204030204" pitchFamily="49" charset="0"/>
+              </a:rPr>
+              <a:t>a</a:t>
+            </a:r>
+            <a:r>
+              <a:rPr lang="en-US" dirty="0">
+                <a:solidFill>
+                  <a:srgbClr val="D4D4D4"/>
+                </a:solidFill>
+                <a:latin typeface="Consolas" panose="020B0609020204030204" pitchFamily="49" charset="0"/>
+              </a:rPr>
+              <a:t> </a:t>
+            </a:r>
+            <a:r>
+              <a:rPr lang="en-US" dirty="0" err="1">
+                <a:solidFill>
+                  <a:srgbClr val="9CDCFE"/>
+                </a:solidFill>
+                <a:latin typeface="Consolas" panose="020B0609020204030204" pitchFamily="49" charset="0"/>
+              </a:rPr>
+              <a:t>routerLink</a:t>
+            </a:r>
+            <a:r>
+              <a:rPr lang="en-US" dirty="0">
+                <a:solidFill>
+                  <a:srgbClr val="D4D4D4"/>
+                </a:solidFill>
+                <a:latin typeface="Consolas" panose="020B0609020204030204" pitchFamily="49" charset="0"/>
+              </a:rPr>
+              <a:t>=</a:t>
+            </a:r>
+            <a:r>
+              <a:rPr lang="en-US" dirty="0">
+                <a:solidFill>
+                  <a:srgbClr val="CE9178"/>
+                </a:solidFill>
+                <a:latin typeface="Consolas" panose="020B0609020204030204" pitchFamily="49" charset="0"/>
+              </a:rPr>
+              <a:t>"/create"</a:t>
+            </a:r>
+            <a:r>
+              <a:rPr lang="en-US" dirty="0">
+                <a:solidFill>
+                  <a:srgbClr val="808080"/>
+                </a:solidFill>
+                <a:latin typeface="Consolas" panose="020B0609020204030204" pitchFamily="49" charset="0"/>
+              </a:rPr>
+              <a:t>&gt;</a:t>
+            </a:r>
+            <a:r>
+              <a:rPr lang="en-US" dirty="0">
+                <a:solidFill>
+                  <a:srgbClr val="D4D4D4"/>
+                </a:solidFill>
+                <a:latin typeface="Consolas" panose="020B0609020204030204" pitchFamily="49" charset="0"/>
+              </a:rPr>
+              <a:t>New</a:t>
+            </a:r>
+            <a:r>
+              <a:rPr lang="en-US" dirty="0">
+                <a:solidFill>
+                  <a:srgbClr val="808080"/>
+                </a:solidFill>
+                <a:latin typeface="Consolas" panose="020B0609020204030204" pitchFamily="49" charset="0"/>
+              </a:rPr>
+              <a:t>&lt;/</a:t>
+            </a:r>
+            <a:r>
+              <a:rPr lang="en-US" dirty="0">
+                <a:solidFill>
+                  <a:srgbClr val="569CD6"/>
+                </a:solidFill>
+                <a:latin typeface="Consolas" panose="020B0609020204030204" pitchFamily="49" charset="0"/>
+              </a:rPr>
+              <a:t>a</a:t>
+            </a:r>
+            <a:r>
+              <a:rPr lang="en-US" dirty="0">
+                <a:solidFill>
+                  <a:srgbClr val="808080"/>
+                </a:solidFill>
+                <a:latin typeface="Consolas" panose="020B0609020204030204" pitchFamily="49" charset="0"/>
+              </a:rPr>
+              <a:t>&gt;</a:t>
+            </a:r>
+            <a:endParaRPr lang="en-US" dirty="0">
+              <a:solidFill>
+                <a:srgbClr val="D4D4D4"/>
+              </a:solidFill>
+              <a:latin typeface="Consolas" panose="020B0609020204030204" pitchFamily="49" charset="0"/>
+            </a:endParaRPr>
+          </a:p>
+          <a:p>
+            <a:pPr marL="0" indent="0">
+              <a:buNone/>
+            </a:pPr>
+            <a:r>
+              <a:rPr lang="en-US" dirty="0">
+                <a:solidFill>
+                  <a:srgbClr val="808080"/>
+                </a:solidFill>
+                <a:latin typeface="Consolas" panose="020B0609020204030204" pitchFamily="49" charset="0"/>
+              </a:rPr>
+              <a:t>&lt;/</a:t>
+            </a:r>
+            <a:r>
+              <a:rPr lang="en-US" dirty="0">
+                <a:solidFill>
+                  <a:srgbClr val="569CD6"/>
+                </a:solidFill>
+                <a:latin typeface="Consolas" panose="020B0609020204030204" pitchFamily="49" charset="0"/>
+              </a:rPr>
+              <a:t>li</a:t>
+            </a:r>
+            <a:r>
+              <a:rPr lang="en-US" dirty="0">
+                <a:solidFill>
+                  <a:srgbClr val="808080"/>
+                </a:solidFill>
+                <a:latin typeface="Consolas" panose="020B0609020204030204" pitchFamily="49" charset="0"/>
+              </a:rPr>
+              <a:t>&gt;</a:t>
+            </a:r>
+            <a:endParaRPr lang="en-US" dirty="0">
+              <a:solidFill>
+                <a:srgbClr val="D4D4D4"/>
+              </a:solidFill>
+              <a:latin typeface="Consolas" panose="020B0609020204030204" pitchFamily="49" charset="0"/>
+            </a:endParaRPr>
+          </a:p>
+          <a:p>
+            <a:pPr marL="0" indent="0">
+              <a:buNone/>
+            </a:pPr>
+            <a:endParaRPr lang="en-NL" dirty="0"/>
+          </a:p>
+        </p:txBody>
+      </p:sp>
+    </p:spTree>
+    <p:extLst>
+      <p:ext uri="{BB962C8B-B14F-4D97-AF65-F5344CB8AC3E}">
+        <p14:creationId xmlns:p14="http://schemas.microsoft.com/office/powerpoint/2010/main" val="324597792"/>
+      </p:ext>
+    </p:extLst>
+  </p:cSld>
+  <p:clrMapOvr>
+    <a:masterClrMapping/>
+  </p:clrMapOvr>
+</p:sld>
+</file>
+
+<file path=ppt/slides/slide59.xml><?xml version="1.0" encoding="utf-8"?>
+<p:sld xmlns:a="http://schemas.openxmlformats.org/drawingml/2006/main" xmlns:r="http://schemas.openxmlformats.org/officeDocument/2006/relationships" xmlns:p="http://schemas.openxmlformats.org/presentationml/2006/main">
+  <p:cSld>
+    <p:spTree>
+      <p:nvGrpSpPr>
+        <p:cNvPr id="1" name=""/>
+        <p:cNvGrpSpPr/>
+        <p:nvPr/>
+      </p:nvGrpSpPr>
+      <p:grpSpPr>
+        <a:xfrm>
+          <a:off x="0" y="0"/>
+          <a:ext cx="0" cy="0"/>
+          <a:chOff x="0" y="0"/>
+          <a:chExt cx="0" cy="0"/>
+        </a:xfrm>
+      </p:grpSpPr>
+      <p:sp>
+        <p:nvSpPr>
+          <p:cNvPr id="2" name="Title 1">
+            <a:extLst>
+              <a:ext uri="{FF2B5EF4-FFF2-40B4-BE49-F238E27FC236}">
+                <a16:creationId xmlns:a16="http://schemas.microsoft.com/office/drawing/2014/main" id="{DD1511C3-1121-4AA1-9E1F-D814525AD2AE}"/>
+              </a:ext>
+            </a:extLst>
+          </p:cNvPr>
+          <p:cNvSpPr>
+            <a:spLocks noGrp="1"/>
+          </p:cNvSpPr>
+          <p:nvPr>
+            <p:ph type="title"/>
+          </p:nvPr>
+        </p:nvSpPr>
+        <p:spPr/>
+        <p:txBody>
+          <a:bodyPr/>
+          <a:lstStyle/>
+          <a:p>
+            <a:r>
+              <a:rPr lang="en-US" dirty="0" err="1"/>
+              <a:t>todo-overview.component.ts</a:t>
+            </a:r>
+            <a:endParaRPr lang="en-NL" dirty="0"/>
+          </a:p>
+        </p:txBody>
+      </p:sp>
+      <p:sp>
+        <p:nvSpPr>
+          <p:cNvPr id="3" name="Content Placeholder 2">
+            <a:extLst>
+              <a:ext uri="{FF2B5EF4-FFF2-40B4-BE49-F238E27FC236}">
+                <a16:creationId xmlns:a16="http://schemas.microsoft.com/office/drawing/2014/main" id="{FC96DA1F-1DBA-4558-AA40-131D5E84C02A}"/>
+              </a:ext>
+            </a:extLst>
+          </p:cNvPr>
+          <p:cNvSpPr>
+            <a:spLocks noGrp="1"/>
+          </p:cNvSpPr>
+          <p:nvPr>
+            <p:ph idx="1"/>
+          </p:nvPr>
+        </p:nvSpPr>
+        <p:spPr/>
+        <p:style>
+          <a:lnRef idx="0">
+            <a:scrgbClr r="0" g="0" b="0"/>
+          </a:lnRef>
+          <a:fillRef idx="1001">
+            <a:schemeClr val="dk2"/>
+          </a:fillRef>
+          <a:effectRef idx="0">
+            <a:scrgbClr r="0" g="0" b="0"/>
+          </a:effectRef>
+          <a:fontRef idx="major"/>
+        </p:style>
+        <p:txBody>
+          <a:bodyPr/>
+          <a:lstStyle/>
+          <a:p>
+            <a:pPr marL="0" indent="0">
+              <a:buNone/>
+            </a:pPr>
+            <a:r>
+              <a:rPr lang="en-US" dirty="0">
+                <a:solidFill>
+                  <a:srgbClr val="C586C0"/>
+                </a:solidFill>
+                <a:latin typeface="Consolas" panose="020B0609020204030204" pitchFamily="49" charset="0"/>
+              </a:rPr>
+              <a:t>export</a:t>
+            </a:r>
+            <a:r>
+              <a:rPr lang="en-US" dirty="0">
+                <a:solidFill>
+                  <a:srgbClr val="D4D4D4"/>
+                </a:solidFill>
+                <a:latin typeface="Consolas" panose="020B0609020204030204" pitchFamily="49" charset="0"/>
+              </a:rPr>
+              <a:t> </a:t>
+            </a:r>
+            <a:r>
+              <a:rPr lang="en-US" dirty="0">
+                <a:solidFill>
+                  <a:srgbClr val="569CD6"/>
+                </a:solidFill>
+                <a:latin typeface="Consolas" panose="020B0609020204030204" pitchFamily="49" charset="0"/>
+              </a:rPr>
+              <a:t>class</a:t>
+            </a:r>
+            <a:r>
+              <a:rPr lang="en-US" dirty="0">
+                <a:solidFill>
+                  <a:srgbClr val="D4D4D4"/>
+                </a:solidFill>
+                <a:latin typeface="Consolas" panose="020B0609020204030204" pitchFamily="49" charset="0"/>
+              </a:rPr>
+              <a:t> </a:t>
+            </a:r>
+            <a:r>
+              <a:rPr lang="en-US" dirty="0" err="1">
+                <a:solidFill>
+                  <a:srgbClr val="4EC9B0"/>
+                </a:solidFill>
+                <a:latin typeface="Consolas" panose="020B0609020204030204" pitchFamily="49" charset="0"/>
+              </a:rPr>
+              <a:t>TodoOverviewComponent</a:t>
+            </a:r>
+            <a:r>
+              <a:rPr lang="en-US" dirty="0">
+                <a:solidFill>
+                  <a:srgbClr val="D4D4D4"/>
+                </a:solidFill>
+                <a:latin typeface="Consolas" panose="020B0609020204030204" pitchFamily="49" charset="0"/>
+              </a:rPr>
+              <a:t> </a:t>
+            </a:r>
+            <a:r>
+              <a:rPr lang="en-US" dirty="0">
+                <a:solidFill>
+                  <a:srgbClr val="569CD6"/>
+                </a:solidFill>
+                <a:latin typeface="Consolas" panose="020B0609020204030204" pitchFamily="49" charset="0"/>
+              </a:rPr>
+              <a:t>implements</a:t>
+            </a:r>
+            <a:r>
+              <a:rPr lang="en-US" dirty="0">
+                <a:solidFill>
+                  <a:srgbClr val="D4D4D4"/>
+                </a:solidFill>
+                <a:latin typeface="Consolas" panose="020B0609020204030204" pitchFamily="49" charset="0"/>
+              </a:rPr>
+              <a:t> </a:t>
+            </a:r>
+            <a:r>
+              <a:rPr lang="en-US" dirty="0" err="1">
+                <a:solidFill>
+                  <a:srgbClr val="4EC9B0"/>
+                </a:solidFill>
+                <a:latin typeface="Consolas" panose="020B0609020204030204" pitchFamily="49" charset="0"/>
+              </a:rPr>
+              <a:t>OnInit</a:t>
+            </a:r>
+            <a:r>
+              <a:rPr lang="en-US" dirty="0">
+                <a:solidFill>
+                  <a:srgbClr val="D4D4D4"/>
+                </a:solidFill>
+                <a:latin typeface="Consolas" panose="020B0609020204030204" pitchFamily="49" charset="0"/>
+              </a:rPr>
+              <a:t> {</a:t>
+            </a:r>
+          </a:p>
+          <a:p>
+            <a:pPr marL="0" indent="0">
+              <a:buNone/>
+            </a:pPr>
+            <a:r>
+              <a:rPr lang="en-US" dirty="0">
+                <a:solidFill>
+                  <a:srgbClr val="D4D4D4"/>
+                </a:solidFill>
+                <a:latin typeface="Consolas" panose="020B0609020204030204" pitchFamily="49" charset="0"/>
+              </a:rPr>
+              <a:t>	@</a:t>
+            </a:r>
+            <a:r>
+              <a:rPr lang="en-US" dirty="0">
+                <a:solidFill>
+                  <a:srgbClr val="DCDCAA"/>
+                </a:solidFill>
+                <a:latin typeface="Consolas" panose="020B0609020204030204" pitchFamily="49" charset="0"/>
+              </a:rPr>
+              <a:t>Input</a:t>
+            </a:r>
+            <a:r>
+              <a:rPr lang="en-US" dirty="0">
+                <a:solidFill>
+                  <a:srgbClr val="D4D4D4"/>
+                </a:solidFill>
+                <a:latin typeface="Consolas" panose="020B0609020204030204" pitchFamily="49" charset="0"/>
+              </a:rPr>
+              <a:t>() </a:t>
+            </a:r>
+            <a:r>
+              <a:rPr lang="en-US" dirty="0">
+                <a:solidFill>
+                  <a:srgbClr val="9CDCFE"/>
+                </a:solidFill>
+                <a:latin typeface="Consolas" panose="020B0609020204030204" pitchFamily="49" charset="0"/>
+              </a:rPr>
+              <a:t>completed</a:t>
+            </a:r>
+            <a:r>
+              <a:rPr lang="en-US" dirty="0">
+                <a:solidFill>
+                  <a:srgbClr val="D4D4D4"/>
+                </a:solidFill>
+                <a:latin typeface="Consolas" panose="020B0609020204030204" pitchFamily="49" charset="0"/>
+              </a:rPr>
+              <a:t>: </a:t>
+            </a:r>
+            <a:r>
+              <a:rPr lang="en-US" dirty="0" err="1">
+                <a:solidFill>
+                  <a:srgbClr val="4EC9B0"/>
+                </a:solidFill>
+                <a:latin typeface="Consolas" panose="020B0609020204030204" pitchFamily="49" charset="0"/>
+              </a:rPr>
+              <a:t>boolean</a:t>
+            </a:r>
+            <a:r>
+              <a:rPr lang="en-US" dirty="0">
+                <a:solidFill>
+                  <a:srgbClr val="D4D4D4"/>
+                </a:solidFill>
+                <a:latin typeface="Consolas" panose="020B0609020204030204" pitchFamily="49" charset="0"/>
+              </a:rPr>
+              <a:t>;</a:t>
+            </a:r>
+            <a:endParaRPr lang="en-US" b="0" dirty="0">
+              <a:solidFill>
+                <a:srgbClr val="D4D4D4"/>
+              </a:solidFill>
+              <a:effectLst/>
+              <a:latin typeface="Consolas" panose="020B0609020204030204" pitchFamily="49" charset="0"/>
+            </a:endParaRPr>
+          </a:p>
+        </p:txBody>
+      </p:sp>
+    </p:spTree>
+    <p:extLst>
+      <p:ext uri="{BB962C8B-B14F-4D97-AF65-F5344CB8AC3E}">
+        <p14:creationId xmlns:p14="http://schemas.microsoft.com/office/powerpoint/2010/main" val="1067267909"/>
+      </p:ext>
+    </p:extLst>
+  </p:cSld>
+  <p:clrMapOvr>
+    <a:masterClrMapping/>
+  </p:clrMapOvr>
+</p:sld>
+</file>
+
 <file path=ppt/slides/slide6.xml><?xml version="1.0" encoding="utf-8"?>
 <p:sld xmlns:a="http://schemas.openxmlformats.org/drawingml/2006/main" xmlns:r="http://schemas.openxmlformats.org/officeDocument/2006/relationships" xmlns:p="http://schemas.openxmlformats.org/presentationml/2006/main">
   <p:cSld>
@@ -21718,6 +23093,2726 @@
     <p:extLst>
       <p:ext uri="{BB962C8B-B14F-4D97-AF65-F5344CB8AC3E}">
         <p14:creationId xmlns:p14="http://schemas.microsoft.com/office/powerpoint/2010/main" val="1427705843"/>
+      </p:ext>
+    </p:extLst>
+  </p:cSld>
+  <p:clrMapOvr>
+    <a:masterClrMapping/>
+  </p:clrMapOvr>
+</p:sld>
+</file>
+
+<file path=ppt/slides/slide60.xml><?xml version="1.0" encoding="utf-8"?>
+<p:sld xmlns:a="http://schemas.openxmlformats.org/drawingml/2006/main" xmlns:r="http://schemas.openxmlformats.org/officeDocument/2006/relationships" xmlns:p="http://schemas.openxmlformats.org/presentationml/2006/main">
+  <p:cSld>
+    <p:spTree>
+      <p:nvGrpSpPr>
+        <p:cNvPr id="1" name=""/>
+        <p:cNvGrpSpPr/>
+        <p:nvPr/>
+      </p:nvGrpSpPr>
+      <p:grpSpPr>
+        <a:xfrm>
+          <a:off x="0" y="0"/>
+          <a:ext cx="0" cy="0"/>
+          <a:chOff x="0" y="0"/>
+          <a:chExt cx="0" cy="0"/>
+        </a:xfrm>
+      </p:grpSpPr>
+      <p:sp>
+        <p:nvSpPr>
+          <p:cNvPr id="2" name="Title 1">
+            <a:extLst>
+              <a:ext uri="{FF2B5EF4-FFF2-40B4-BE49-F238E27FC236}">
+                <a16:creationId xmlns:a16="http://schemas.microsoft.com/office/drawing/2014/main" id="{E375C22B-7274-4EA2-AF67-C84C41397022}"/>
+              </a:ext>
+            </a:extLst>
+          </p:cNvPr>
+          <p:cNvSpPr>
+            <a:spLocks noGrp="1"/>
+          </p:cNvSpPr>
+          <p:nvPr>
+            <p:ph type="title"/>
+          </p:nvPr>
+        </p:nvSpPr>
+        <p:spPr/>
+        <p:txBody>
+          <a:bodyPr/>
+          <a:lstStyle/>
+          <a:p>
+            <a:r>
+              <a:rPr lang="en-US" dirty="0"/>
+              <a:t>home.component.html</a:t>
+            </a:r>
+            <a:endParaRPr lang="en-NL" dirty="0"/>
+          </a:p>
+        </p:txBody>
+      </p:sp>
+      <p:sp>
+        <p:nvSpPr>
+          <p:cNvPr id="3" name="Content Placeholder 2">
+            <a:extLst>
+              <a:ext uri="{FF2B5EF4-FFF2-40B4-BE49-F238E27FC236}">
+                <a16:creationId xmlns:a16="http://schemas.microsoft.com/office/drawing/2014/main" id="{C8FEE144-F48C-42F8-87DC-371EC3ED3007}"/>
+              </a:ext>
+            </a:extLst>
+          </p:cNvPr>
+          <p:cNvSpPr>
+            <a:spLocks noGrp="1"/>
+          </p:cNvSpPr>
+          <p:nvPr>
+            <p:ph idx="1"/>
+          </p:nvPr>
+        </p:nvSpPr>
+        <p:spPr/>
+        <p:style>
+          <a:lnRef idx="0">
+            <a:scrgbClr r="0" g="0" b="0"/>
+          </a:lnRef>
+          <a:fillRef idx="1001">
+            <a:schemeClr val="dk2"/>
+          </a:fillRef>
+          <a:effectRef idx="0">
+            <a:scrgbClr r="0" g="0" b="0"/>
+          </a:effectRef>
+          <a:fontRef idx="major"/>
+        </p:style>
+        <p:txBody>
+          <a:bodyPr/>
+          <a:lstStyle/>
+          <a:p>
+            <a:pPr marL="0" indent="0">
+              <a:buNone/>
+            </a:pPr>
+            <a:r>
+              <a:rPr lang="en-US" dirty="0">
+                <a:solidFill>
+                  <a:srgbClr val="808080"/>
+                </a:solidFill>
+                <a:latin typeface="Consolas" panose="020B0609020204030204" pitchFamily="49" charset="0"/>
+              </a:rPr>
+              <a:t>&lt;</a:t>
+            </a:r>
+            <a:r>
+              <a:rPr lang="en-US" dirty="0">
+                <a:solidFill>
+                  <a:srgbClr val="569CD6"/>
+                </a:solidFill>
+                <a:latin typeface="Consolas" panose="020B0609020204030204" pitchFamily="49" charset="0"/>
+              </a:rPr>
+              <a:t>div</a:t>
+            </a:r>
+            <a:r>
+              <a:rPr lang="en-US" dirty="0">
+                <a:solidFill>
+                  <a:srgbClr val="D4D4D4"/>
+                </a:solidFill>
+                <a:latin typeface="Consolas" panose="020B0609020204030204" pitchFamily="49" charset="0"/>
+              </a:rPr>
+              <a:t> </a:t>
+            </a:r>
+            <a:r>
+              <a:rPr lang="en-US" dirty="0">
+                <a:solidFill>
+                  <a:srgbClr val="9CDCFE"/>
+                </a:solidFill>
+                <a:latin typeface="Consolas" panose="020B0609020204030204" pitchFamily="49" charset="0"/>
+              </a:rPr>
+              <a:t>class</a:t>
+            </a:r>
+            <a:r>
+              <a:rPr lang="en-US" dirty="0">
+                <a:solidFill>
+                  <a:srgbClr val="D4D4D4"/>
+                </a:solidFill>
+                <a:latin typeface="Consolas" panose="020B0609020204030204" pitchFamily="49" charset="0"/>
+              </a:rPr>
+              <a:t>=</a:t>
+            </a:r>
+            <a:r>
+              <a:rPr lang="en-US" dirty="0">
+                <a:solidFill>
+                  <a:srgbClr val="CE9178"/>
+                </a:solidFill>
+                <a:latin typeface="Consolas" panose="020B0609020204030204" pitchFamily="49" charset="0"/>
+              </a:rPr>
+              <a:t>"container"</a:t>
+            </a:r>
+            <a:r>
+              <a:rPr lang="en-US" dirty="0">
+                <a:solidFill>
+                  <a:srgbClr val="808080"/>
+                </a:solidFill>
+                <a:latin typeface="Consolas" panose="020B0609020204030204" pitchFamily="49" charset="0"/>
+              </a:rPr>
+              <a:t>&gt;</a:t>
+            </a:r>
+            <a:endParaRPr lang="en-US" dirty="0">
+              <a:solidFill>
+                <a:srgbClr val="D4D4D4"/>
+              </a:solidFill>
+              <a:latin typeface="Consolas" panose="020B0609020204030204" pitchFamily="49" charset="0"/>
+            </a:endParaRPr>
+          </a:p>
+          <a:p>
+            <a:pPr marL="457200" lvl="1" indent="0">
+              <a:buNone/>
+            </a:pPr>
+            <a:r>
+              <a:rPr lang="en-US" dirty="0">
+                <a:solidFill>
+                  <a:srgbClr val="808080"/>
+                </a:solidFill>
+                <a:latin typeface="Consolas" panose="020B0609020204030204" pitchFamily="49" charset="0"/>
+              </a:rPr>
+              <a:t>&lt;</a:t>
+            </a:r>
+            <a:r>
+              <a:rPr lang="en-US" dirty="0">
+                <a:solidFill>
+                  <a:srgbClr val="569CD6"/>
+                </a:solidFill>
+                <a:latin typeface="Consolas" panose="020B0609020204030204" pitchFamily="49" charset="0"/>
+              </a:rPr>
+              <a:t>app-</a:t>
+            </a:r>
+            <a:r>
+              <a:rPr lang="en-US" dirty="0" err="1">
+                <a:solidFill>
+                  <a:srgbClr val="569CD6"/>
+                </a:solidFill>
+                <a:latin typeface="Consolas" panose="020B0609020204030204" pitchFamily="49" charset="0"/>
+              </a:rPr>
+              <a:t>todo</a:t>
+            </a:r>
+            <a:r>
+              <a:rPr lang="en-US" dirty="0">
+                <a:solidFill>
+                  <a:srgbClr val="569CD6"/>
+                </a:solidFill>
+                <a:latin typeface="Consolas" panose="020B0609020204030204" pitchFamily="49" charset="0"/>
+              </a:rPr>
+              <a:t>-overview</a:t>
+            </a:r>
+            <a:r>
+              <a:rPr lang="en-US" dirty="0">
+                <a:solidFill>
+                  <a:srgbClr val="D4D4D4"/>
+                </a:solidFill>
+                <a:latin typeface="Consolas" panose="020B0609020204030204" pitchFamily="49" charset="0"/>
+              </a:rPr>
+              <a:t> [</a:t>
+            </a:r>
+            <a:r>
+              <a:rPr lang="en-US" dirty="0">
+                <a:solidFill>
+                  <a:srgbClr val="9CDCFE"/>
+                </a:solidFill>
+                <a:latin typeface="Consolas" panose="020B0609020204030204" pitchFamily="49" charset="0"/>
+              </a:rPr>
+              <a:t>completed</a:t>
+            </a:r>
+            <a:r>
+              <a:rPr lang="en-US" dirty="0">
+                <a:solidFill>
+                  <a:srgbClr val="D4D4D4"/>
+                </a:solidFill>
+                <a:latin typeface="Consolas" panose="020B0609020204030204" pitchFamily="49" charset="0"/>
+              </a:rPr>
+              <a:t>]=</a:t>
+            </a:r>
+            <a:r>
+              <a:rPr lang="en-US" dirty="0">
+                <a:solidFill>
+                  <a:srgbClr val="CE9178"/>
+                </a:solidFill>
+                <a:latin typeface="Consolas" panose="020B0609020204030204" pitchFamily="49" charset="0"/>
+              </a:rPr>
+              <a:t>"false"</a:t>
+            </a:r>
+            <a:r>
+              <a:rPr lang="en-US" dirty="0">
+                <a:solidFill>
+                  <a:srgbClr val="808080"/>
+                </a:solidFill>
+                <a:latin typeface="Consolas" panose="020B0609020204030204" pitchFamily="49" charset="0"/>
+              </a:rPr>
+              <a:t>&gt;</a:t>
+            </a:r>
+          </a:p>
+          <a:p>
+            <a:pPr marL="457200" lvl="1" indent="0">
+              <a:buNone/>
+            </a:pPr>
+            <a:r>
+              <a:rPr lang="en-US" dirty="0">
+                <a:solidFill>
+                  <a:srgbClr val="808080"/>
+                </a:solidFill>
+                <a:latin typeface="Consolas" panose="020B0609020204030204" pitchFamily="49" charset="0"/>
+              </a:rPr>
+              <a:t>&lt;/</a:t>
+            </a:r>
+            <a:r>
+              <a:rPr lang="en-US" dirty="0">
+                <a:solidFill>
+                  <a:srgbClr val="569CD6"/>
+                </a:solidFill>
+                <a:latin typeface="Consolas" panose="020B0609020204030204" pitchFamily="49" charset="0"/>
+              </a:rPr>
+              <a:t>app-</a:t>
+            </a:r>
+            <a:r>
+              <a:rPr lang="en-US" dirty="0" err="1">
+                <a:solidFill>
+                  <a:srgbClr val="569CD6"/>
+                </a:solidFill>
+                <a:latin typeface="Consolas" panose="020B0609020204030204" pitchFamily="49" charset="0"/>
+              </a:rPr>
+              <a:t>todo</a:t>
+            </a:r>
+            <a:r>
+              <a:rPr lang="en-US" dirty="0">
+                <a:solidFill>
+                  <a:srgbClr val="569CD6"/>
+                </a:solidFill>
+                <a:latin typeface="Consolas" panose="020B0609020204030204" pitchFamily="49" charset="0"/>
+              </a:rPr>
+              <a:t>-overview</a:t>
+            </a:r>
+            <a:r>
+              <a:rPr lang="en-US" dirty="0">
+                <a:solidFill>
+                  <a:srgbClr val="808080"/>
+                </a:solidFill>
+                <a:latin typeface="Consolas" panose="020B0609020204030204" pitchFamily="49" charset="0"/>
+              </a:rPr>
+              <a:t>&gt;</a:t>
+            </a:r>
+            <a:endParaRPr lang="en-US" dirty="0">
+              <a:solidFill>
+                <a:srgbClr val="D4D4D4"/>
+              </a:solidFill>
+              <a:latin typeface="Consolas" panose="020B0609020204030204" pitchFamily="49" charset="0"/>
+            </a:endParaRPr>
+          </a:p>
+          <a:p>
+            <a:pPr marL="457200" lvl="1" indent="0">
+              <a:buNone/>
+            </a:pPr>
+            <a:r>
+              <a:rPr lang="en-US" dirty="0">
+                <a:solidFill>
+                  <a:srgbClr val="808080"/>
+                </a:solidFill>
+                <a:latin typeface="Consolas" panose="020B0609020204030204" pitchFamily="49" charset="0"/>
+              </a:rPr>
+              <a:t>&lt;</a:t>
+            </a:r>
+            <a:r>
+              <a:rPr lang="en-US" dirty="0">
+                <a:solidFill>
+                  <a:srgbClr val="569CD6"/>
+                </a:solidFill>
+                <a:latin typeface="Consolas" panose="020B0609020204030204" pitchFamily="49" charset="0"/>
+              </a:rPr>
+              <a:t>app-</a:t>
+            </a:r>
+            <a:r>
+              <a:rPr lang="en-US" dirty="0" err="1">
+                <a:solidFill>
+                  <a:srgbClr val="569CD6"/>
+                </a:solidFill>
+                <a:latin typeface="Consolas" panose="020B0609020204030204" pitchFamily="49" charset="0"/>
+              </a:rPr>
+              <a:t>todo</a:t>
+            </a:r>
+            <a:r>
+              <a:rPr lang="en-US" dirty="0">
+                <a:solidFill>
+                  <a:srgbClr val="569CD6"/>
+                </a:solidFill>
+                <a:latin typeface="Consolas" panose="020B0609020204030204" pitchFamily="49" charset="0"/>
+              </a:rPr>
+              <a:t>-overview</a:t>
+            </a:r>
+            <a:r>
+              <a:rPr lang="en-US" dirty="0">
+                <a:solidFill>
+                  <a:srgbClr val="D4D4D4"/>
+                </a:solidFill>
+                <a:latin typeface="Consolas" panose="020B0609020204030204" pitchFamily="49" charset="0"/>
+              </a:rPr>
+              <a:t> [</a:t>
+            </a:r>
+            <a:r>
+              <a:rPr lang="en-US" dirty="0">
+                <a:solidFill>
+                  <a:srgbClr val="9CDCFE"/>
+                </a:solidFill>
+                <a:latin typeface="Consolas" panose="020B0609020204030204" pitchFamily="49" charset="0"/>
+              </a:rPr>
+              <a:t>completed</a:t>
+            </a:r>
+            <a:r>
+              <a:rPr lang="en-US" dirty="0">
+                <a:solidFill>
+                  <a:srgbClr val="D4D4D4"/>
+                </a:solidFill>
+                <a:latin typeface="Consolas" panose="020B0609020204030204" pitchFamily="49" charset="0"/>
+              </a:rPr>
+              <a:t>]=</a:t>
+            </a:r>
+            <a:r>
+              <a:rPr lang="en-US" dirty="0">
+                <a:solidFill>
+                  <a:srgbClr val="CE9178"/>
+                </a:solidFill>
+                <a:latin typeface="Consolas" panose="020B0609020204030204" pitchFamily="49" charset="0"/>
+              </a:rPr>
+              <a:t>"true"</a:t>
+            </a:r>
+            <a:r>
+              <a:rPr lang="en-US" dirty="0">
+                <a:solidFill>
+                  <a:srgbClr val="808080"/>
+                </a:solidFill>
+                <a:latin typeface="Consolas" panose="020B0609020204030204" pitchFamily="49" charset="0"/>
+              </a:rPr>
+              <a:t>&gt;</a:t>
+            </a:r>
+          </a:p>
+          <a:p>
+            <a:pPr marL="457200" lvl="1" indent="0">
+              <a:buNone/>
+            </a:pPr>
+            <a:r>
+              <a:rPr lang="en-US" dirty="0">
+                <a:solidFill>
+                  <a:srgbClr val="808080"/>
+                </a:solidFill>
+                <a:latin typeface="Consolas" panose="020B0609020204030204" pitchFamily="49" charset="0"/>
+              </a:rPr>
+              <a:t>&lt;/</a:t>
+            </a:r>
+            <a:r>
+              <a:rPr lang="en-US" dirty="0">
+                <a:solidFill>
+                  <a:srgbClr val="569CD6"/>
+                </a:solidFill>
+                <a:latin typeface="Consolas" panose="020B0609020204030204" pitchFamily="49" charset="0"/>
+              </a:rPr>
+              <a:t>app-</a:t>
+            </a:r>
+            <a:r>
+              <a:rPr lang="en-US" dirty="0" err="1">
+                <a:solidFill>
+                  <a:srgbClr val="569CD6"/>
+                </a:solidFill>
+                <a:latin typeface="Consolas" panose="020B0609020204030204" pitchFamily="49" charset="0"/>
+              </a:rPr>
+              <a:t>todo</a:t>
+            </a:r>
+            <a:r>
+              <a:rPr lang="en-US" dirty="0">
+                <a:solidFill>
+                  <a:srgbClr val="569CD6"/>
+                </a:solidFill>
+                <a:latin typeface="Consolas" panose="020B0609020204030204" pitchFamily="49" charset="0"/>
+              </a:rPr>
+              <a:t>-overview</a:t>
+            </a:r>
+            <a:r>
+              <a:rPr lang="en-US" dirty="0">
+                <a:solidFill>
+                  <a:srgbClr val="808080"/>
+                </a:solidFill>
+                <a:latin typeface="Consolas" panose="020B0609020204030204" pitchFamily="49" charset="0"/>
+              </a:rPr>
+              <a:t>&gt;</a:t>
+            </a:r>
+            <a:endParaRPr lang="en-US" dirty="0">
+              <a:solidFill>
+                <a:srgbClr val="D4D4D4"/>
+              </a:solidFill>
+              <a:latin typeface="Consolas" panose="020B0609020204030204" pitchFamily="49" charset="0"/>
+            </a:endParaRPr>
+          </a:p>
+          <a:p>
+            <a:pPr marL="0" indent="0">
+              <a:buNone/>
+            </a:pPr>
+            <a:r>
+              <a:rPr lang="en-US" dirty="0">
+                <a:solidFill>
+                  <a:srgbClr val="808080"/>
+                </a:solidFill>
+                <a:latin typeface="Consolas" panose="020B0609020204030204" pitchFamily="49" charset="0"/>
+              </a:rPr>
+              <a:t>&lt;/</a:t>
+            </a:r>
+            <a:r>
+              <a:rPr lang="en-US" dirty="0">
+                <a:solidFill>
+                  <a:srgbClr val="569CD6"/>
+                </a:solidFill>
+                <a:latin typeface="Consolas" panose="020B0609020204030204" pitchFamily="49" charset="0"/>
+              </a:rPr>
+              <a:t>div</a:t>
+            </a:r>
+            <a:r>
+              <a:rPr lang="en-US" dirty="0">
+                <a:solidFill>
+                  <a:srgbClr val="808080"/>
+                </a:solidFill>
+                <a:latin typeface="Consolas" panose="020B0609020204030204" pitchFamily="49" charset="0"/>
+              </a:rPr>
+              <a:t>&gt;</a:t>
+            </a:r>
+            <a:endParaRPr lang="en-US" dirty="0">
+              <a:solidFill>
+                <a:srgbClr val="D4D4D4"/>
+              </a:solidFill>
+              <a:latin typeface="Consolas" panose="020B0609020204030204" pitchFamily="49" charset="0"/>
+            </a:endParaRPr>
+          </a:p>
+          <a:p>
+            <a:pPr marL="0" indent="0">
+              <a:buNone/>
+            </a:pPr>
+            <a:endParaRPr lang="en-NL" dirty="0"/>
+          </a:p>
+        </p:txBody>
+      </p:sp>
+    </p:spTree>
+    <p:extLst>
+      <p:ext uri="{BB962C8B-B14F-4D97-AF65-F5344CB8AC3E}">
+        <p14:creationId xmlns:p14="http://schemas.microsoft.com/office/powerpoint/2010/main" val="711252200"/>
+      </p:ext>
+    </p:extLst>
+  </p:cSld>
+  <p:clrMapOvr>
+    <a:masterClrMapping/>
+  </p:clrMapOvr>
+</p:sld>
+</file>
+
+<file path=ppt/slides/slide61.xml><?xml version="1.0" encoding="utf-8"?>
+<p:sld xmlns:a="http://schemas.openxmlformats.org/drawingml/2006/main" xmlns:r="http://schemas.openxmlformats.org/officeDocument/2006/relationships" xmlns:p="http://schemas.openxmlformats.org/presentationml/2006/main">
+  <p:cSld>
+    <p:spTree>
+      <p:nvGrpSpPr>
+        <p:cNvPr id="1" name=""/>
+        <p:cNvGrpSpPr/>
+        <p:nvPr/>
+      </p:nvGrpSpPr>
+      <p:grpSpPr>
+        <a:xfrm>
+          <a:off x="0" y="0"/>
+          <a:ext cx="0" cy="0"/>
+          <a:chOff x="0" y="0"/>
+          <a:chExt cx="0" cy="0"/>
+        </a:xfrm>
+      </p:grpSpPr>
+      <p:sp>
+        <p:nvSpPr>
+          <p:cNvPr id="2" name="Title 1">
+            <a:extLst>
+              <a:ext uri="{FF2B5EF4-FFF2-40B4-BE49-F238E27FC236}">
+                <a16:creationId xmlns:a16="http://schemas.microsoft.com/office/drawing/2014/main" id="{F5A1484F-05C5-4070-9F61-49E4F5E1EA66}"/>
+              </a:ext>
+            </a:extLst>
+          </p:cNvPr>
+          <p:cNvSpPr>
+            <a:spLocks noGrp="1"/>
+          </p:cNvSpPr>
+          <p:nvPr>
+            <p:ph type="title"/>
+          </p:nvPr>
+        </p:nvSpPr>
+        <p:spPr/>
+        <p:txBody>
+          <a:bodyPr/>
+          <a:lstStyle/>
+          <a:p>
+            <a:r>
+              <a:rPr lang="en-US" dirty="0" err="1"/>
+              <a:t>todo.service.ts</a:t>
+            </a:r>
+            <a:endParaRPr lang="en-NL" dirty="0"/>
+          </a:p>
+        </p:txBody>
+      </p:sp>
+      <p:sp>
+        <p:nvSpPr>
+          <p:cNvPr id="3" name="Content Placeholder 2">
+            <a:extLst>
+              <a:ext uri="{FF2B5EF4-FFF2-40B4-BE49-F238E27FC236}">
+                <a16:creationId xmlns:a16="http://schemas.microsoft.com/office/drawing/2014/main" id="{5E7C1EE6-2EC7-428B-8E46-441F4EE23244}"/>
+              </a:ext>
+            </a:extLst>
+          </p:cNvPr>
+          <p:cNvSpPr>
+            <a:spLocks noGrp="1"/>
+          </p:cNvSpPr>
+          <p:nvPr>
+            <p:ph idx="1"/>
+          </p:nvPr>
+        </p:nvSpPr>
+        <p:spPr/>
+        <p:style>
+          <a:lnRef idx="0">
+            <a:scrgbClr r="0" g="0" b="0"/>
+          </a:lnRef>
+          <a:fillRef idx="1001">
+            <a:schemeClr val="dk2"/>
+          </a:fillRef>
+          <a:effectRef idx="0">
+            <a:scrgbClr r="0" g="0" b="0"/>
+          </a:effectRef>
+          <a:fontRef idx="major"/>
+        </p:style>
+        <p:txBody>
+          <a:bodyPr>
+            <a:normAutofit/>
+          </a:bodyPr>
+          <a:lstStyle/>
+          <a:p>
+            <a:pPr marL="0" indent="0">
+              <a:buNone/>
+            </a:pPr>
+            <a:r>
+              <a:rPr lang="en-US" dirty="0">
+                <a:solidFill>
+                  <a:srgbClr val="569CD6"/>
+                </a:solidFill>
+                <a:latin typeface="Consolas" panose="020B0609020204030204" pitchFamily="49" charset="0"/>
+              </a:rPr>
+              <a:t>public</a:t>
+            </a:r>
+            <a:r>
+              <a:rPr lang="en-US" dirty="0">
+                <a:solidFill>
+                  <a:srgbClr val="D4D4D4"/>
+                </a:solidFill>
+                <a:latin typeface="Consolas" panose="020B0609020204030204" pitchFamily="49" charset="0"/>
+              </a:rPr>
+              <a:t> </a:t>
+            </a:r>
+            <a:r>
+              <a:rPr lang="en-US" dirty="0" err="1">
+                <a:solidFill>
+                  <a:srgbClr val="DCDCAA"/>
+                </a:solidFill>
+                <a:latin typeface="Consolas" panose="020B0609020204030204" pitchFamily="49" charset="0"/>
+              </a:rPr>
+              <a:t>getCompletedToDos</a:t>
+            </a:r>
+            <a:r>
+              <a:rPr lang="en-US" dirty="0">
+                <a:solidFill>
+                  <a:srgbClr val="D4D4D4"/>
+                </a:solidFill>
+                <a:latin typeface="Consolas" panose="020B0609020204030204" pitchFamily="49" charset="0"/>
+              </a:rPr>
+              <a:t>(): </a:t>
+            </a:r>
+            <a:r>
+              <a:rPr lang="en-US" dirty="0">
+                <a:solidFill>
+                  <a:srgbClr val="4EC9B0"/>
+                </a:solidFill>
+                <a:latin typeface="Consolas" panose="020B0609020204030204" pitchFamily="49" charset="0"/>
+              </a:rPr>
+              <a:t>Observable</a:t>
+            </a:r>
+            <a:r>
+              <a:rPr lang="en-US" dirty="0">
+                <a:solidFill>
+                  <a:srgbClr val="D4D4D4"/>
+                </a:solidFill>
+                <a:latin typeface="Consolas" panose="020B0609020204030204" pitchFamily="49" charset="0"/>
+              </a:rPr>
+              <a:t>&lt;</a:t>
+            </a:r>
+            <a:r>
+              <a:rPr lang="en-US" dirty="0" err="1">
+                <a:solidFill>
+                  <a:srgbClr val="4EC9B0"/>
+                </a:solidFill>
+                <a:latin typeface="Consolas" panose="020B0609020204030204" pitchFamily="49" charset="0"/>
+              </a:rPr>
+              <a:t>Todo</a:t>
+            </a:r>
+            <a:r>
+              <a:rPr lang="en-US" dirty="0">
+                <a:solidFill>
+                  <a:srgbClr val="D4D4D4"/>
+                </a:solidFill>
+                <a:latin typeface="Consolas" panose="020B0609020204030204" pitchFamily="49" charset="0"/>
+              </a:rPr>
+              <a:t>[]&gt; {</a:t>
+            </a:r>
+          </a:p>
+          <a:p>
+            <a:pPr marL="457200" lvl="1" indent="0">
+              <a:buNone/>
+            </a:pPr>
+            <a:r>
+              <a:rPr lang="en-US" dirty="0">
+                <a:solidFill>
+                  <a:srgbClr val="C586C0"/>
+                </a:solidFill>
+                <a:latin typeface="Consolas" panose="020B0609020204030204" pitchFamily="49" charset="0"/>
+              </a:rPr>
+              <a:t>return</a:t>
+            </a:r>
+            <a:r>
+              <a:rPr lang="en-US" dirty="0">
+                <a:solidFill>
+                  <a:srgbClr val="D4D4D4"/>
+                </a:solidFill>
+                <a:latin typeface="Consolas" panose="020B0609020204030204" pitchFamily="49" charset="0"/>
+              </a:rPr>
+              <a:t> </a:t>
+            </a:r>
+            <a:r>
+              <a:rPr lang="en-US" dirty="0" err="1">
+                <a:solidFill>
+                  <a:srgbClr val="569CD6"/>
+                </a:solidFill>
+                <a:latin typeface="Consolas" panose="020B0609020204030204" pitchFamily="49" charset="0"/>
+              </a:rPr>
+              <a:t>this</a:t>
+            </a:r>
+            <a:r>
+              <a:rPr lang="en-US" dirty="0" err="1">
+                <a:solidFill>
+                  <a:srgbClr val="D4D4D4"/>
+                </a:solidFill>
+                <a:latin typeface="Consolas" panose="020B0609020204030204" pitchFamily="49" charset="0"/>
+              </a:rPr>
+              <a:t>.</a:t>
+            </a:r>
+            <a:r>
+              <a:rPr lang="en-US" dirty="0" err="1">
+                <a:solidFill>
+                  <a:srgbClr val="9CDCFE"/>
+                </a:solidFill>
+                <a:latin typeface="Consolas" panose="020B0609020204030204" pitchFamily="49" charset="0"/>
+              </a:rPr>
+              <a:t>http</a:t>
+            </a:r>
+            <a:r>
+              <a:rPr lang="en-US" dirty="0" err="1">
+                <a:solidFill>
+                  <a:srgbClr val="D4D4D4"/>
+                </a:solidFill>
+                <a:latin typeface="Consolas" panose="020B0609020204030204" pitchFamily="49" charset="0"/>
+              </a:rPr>
+              <a:t>.</a:t>
+            </a:r>
+            <a:r>
+              <a:rPr lang="en-US" dirty="0" err="1">
+                <a:solidFill>
+                  <a:srgbClr val="DCDCAA"/>
+                </a:solidFill>
+                <a:latin typeface="Consolas" panose="020B0609020204030204" pitchFamily="49" charset="0"/>
+              </a:rPr>
+              <a:t>get</a:t>
+            </a:r>
+            <a:r>
+              <a:rPr lang="en-US" dirty="0">
+                <a:solidFill>
+                  <a:srgbClr val="D4D4D4"/>
+                </a:solidFill>
+                <a:latin typeface="Consolas" panose="020B0609020204030204" pitchFamily="49" charset="0"/>
+              </a:rPr>
+              <a:t>&lt;</a:t>
+            </a:r>
+            <a:r>
+              <a:rPr lang="en-US" dirty="0" err="1">
+                <a:solidFill>
+                  <a:srgbClr val="4EC9B0"/>
+                </a:solidFill>
+                <a:latin typeface="Consolas" panose="020B0609020204030204" pitchFamily="49" charset="0"/>
+              </a:rPr>
+              <a:t>Todo</a:t>
+            </a:r>
+            <a:r>
+              <a:rPr lang="en-US" dirty="0">
+                <a:solidFill>
+                  <a:srgbClr val="D4D4D4"/>
+                </a:solidFill>
+                <a:latin typeface="Consolas" panose="020B0609020204030204" pitchFamily="49" charset="0"/>
+              </a:rPr>
+              <a:t>[]&gt;</a:t>
+            </a:r>
+          </a:p>
+          <a:p>
+            <a:pPr marL="457200" lvl="1" indent="0">
+              <a:buNone/>
+            </a:pPr>
+            <a:r>
+              <a:rPr lang="en-US" dirty="0">
+                <a:solidFill>
+                  <a:srgbClr val="D4D4D4"/>
+                </a:solidFill>
+                <a:latin typeface="Consolas" panose="020B0609020204030204" pitchFamily="49" charset="0"/>
+              </a:rPr>
+              <a:t>(</a:t>
+            </a:r>
+            <a:r>
+              <a:rPr lang="en-US" dirty="0">
+                <a:solidFill>
+                  <a:srgbClr val="CE9178"/>
+                </a:solidFill>
+                <a:latin typeface="Consolas" panose="020B0609020204030204" pitchFamily="49" charset="0"/>
+              </a:rPr>
+              <a:t>'http://localhost:8080/</a:t>
+            </a:r>
+            <a:r>
+              <a:rPr lang="en-US" dirty="0" err="1">
+                <a:solidFill>
+                  <a:srgbClr val="CE9178"/>
+                </a:solidFill>
+                <a:latin typeface="Consolas" panose="020B0609020204030204" pitchFamily="49" charset="0"/>
+              </a:rPr>
+              <a:t>api</a:t>
+            </a:r>
+            <a:r>
+              <a:rPr lang="en-US" dirty="0">
+                <a:solidFill>
+                  <a:srgbClr val="CE9178"/>
+                </a:solidFill>
+                <a:latin typeface="Consolas" panose="020B0609020204030204" pitchFamily="49" charset="0"/>
+              </a:rPr>
+              <a:t>/</a:t>
+            </a:r>
+            <a:r>
+              <a:rPr lang="en-US" dirty="0" err="1">
+                <a:solidFill>
+                  <a:srgbClr val="CE9178"/>
+                </a:solidFill>
+                <a:latin typeface="Consolas" panose="020B0609020204030204" pitchFamily="49" charset="0"/>
+              </a:rPr>
+              <a:t>todo</a:t>
+            </a:r>
+            <a:r>
+              <a:rPr lang="en-US" dirty="0">
+                <a:solidFill>
+                  <a:srgbClr val="CE9178"/>
+                </a:solidFill>
+                <a:latin typeface="Consolas" panose="020B0609020204030204" pitchFamily="49" charset="0"/>
+              </a:rPr>
+              <a:t>/completed'</a:t>
+            </a:r>
+            <a:r>
+              <a:rPr lang="en-US" dirty="0">
+                <a:solidFill>
+                  <a:srgbClr val="D4D4D4"/>
+                </a:solidFill>
+                <a:latin typeface="Consolas" panose="020B0609020204030204" pitchFamily="49" charset="0"/>
+              </a:rPr>
+              <a:t>);</a:t>
+            </a:r>
+          </a:p>
+          <a:p>
+            <a:pPr marL="0" indent="0">
+              <a:buNone/>
+            </a:pPr>
+            <a:r>
+              <a:rPr lang="en-US" dirty="0">
+                <a:solidFill>
+                  <a:srgbClr val="D4D4D4"/>
+                </a:solidFill>
+                <a:latin typeface="Consolas" panose="020B0609020204030204" pitchFamily="49" charset="0"/>
+              </a:rPr>
+              <a:t>}</a:t>
+            </a:r>
+          </a:p>
+          <a:p>
+            <a:pPr marL="0" indent="0">
+              <a:buNone/>
+            </a:pPr>
+            <a:br>
+              <a:rPr lang="en-US" dirty="0">
+                <a:solidFill>
+                  <a:srgbClr val="D4D4D4"/>
+                </a:solidFill>
+                <a:latin typeface="Consolas" panose="020B0609020204030204" pitchFamily="49" charset="0"/>
+              </a:rPr>
+            </a:br>
+            <a:r>
+              <a:rPr lang="en-US" dirty="0">
+                <a:solidFill>
+                  <a:srgbClr val="569CD6"/>
+                </a:solidFill>
+                <a:latin typeface="Consolas" panose="020B0609020204030204" pitchFamily="49" charset="0"/>
+              </a:rPr>
+              <a:t>public</a:t>
+            </a:r>
+            <a:r>
+              <a:rPr lang="en-US" dirty="0">
+                <a:solidFill>
+                  <a:srgbClr val="D4D4D4"/>
+                </a:solidFill>
+                <a:latin typeface="Consolas" panose="020B0609020204030204" pitchFamily="49" charset="0"/>
+              </a:rPr>
+              <a:t> </a:t>
+            </a:r>
+            <a:r>
+              <a:rPr lang="en-US" dirty="0" err="1">
+                <a:solidFill>
+                  <a:srgbClr val="DCDCAA"/>
+                </a:solidFill>
+                <a:latin typeface="Consolas" panose="020B0609020204030204" pitchFamily="49" charset="0"/>
+              </a:rPr>
+              <a:t>getUncompletedToDos</a:t>
+            </a:r>
+            <a:r>
+              <a:rPr lang="en-US" dirty="0">
+                <a:solidFill>
+                  <a:srgbClr val="D4D4D4"/>
+                </a:solidFill>
+                <a:latin typeface="Consolas" panose="020B0609020204030204" pitchFamily="49" charset="0"/>
+              </a:rPr>
+              <a:t>(): </a:t>
+            </a:r>
+            <a:r>
+              <a:rPr lang="en-US" dirty="0">
+                <a:solidFill>
+                  <a:srgbClr val="4EC9B0"/>
+                </a:solidFill>
+                <a:latin typeface="Consolas" panose="020B0609020204030204" pitchFamily="49" charset="0"/>
+              </a:rPr>
+              <a:t>Observable</a:t>
+            </a:r>
+            <a:r>
+              <a:rPr lang="en-US" dirty="0">
+                <a:solidFill>
+                  <a:srgbClr val="D4D4D4"/>
+                </a:solidFill>
+                <a:latin typeface="Consolas" panose="020B0609020204030204" pitchFamily="49" charset="0"/>
+              </a:rPr>
+              <a:t>&lt;</a:t>
+            </a:r>
+            <a:r>
+              <a:rPr lang="en-US" dirty="0" err="1">
+                <a:solidFill>
+                  <a:srgbClr val="4EC9B0"/>
+                </a:solidFill>
+                <a:latin typeface="Consolas" panose="020B0609020204030204" pitchFamily="49" charset="0"/>
+              </a:rPr>
+              <a:t>Todo</a:t>
+            </a:r>
+            <a:r>
+              <a:rPr lang="en-US" dirty="0">
+                <a:solidFill>
+                  <a:srgbClr val="D4D4D4"/>
+                </a:solidFill>
+                <a:latin typeface="Consolas" panose="020B0609020204030204" pitchFamily="49" charset="0"/>
+              </a:rPr>
+              <a:t>[]&gt; {</a:t>
+            </a:r>
+          </a:p>
+          <a:p>
+            <a:pPr marL="457200" lvl="1" indent="0">
+              <a:buNone/>
+            </a:pPr>
+            <a:r>
+              <a:rPr lang="en-US" dirty="0">
+                <a:solidFill>
+                  <a:srgbClr val="C586C0"/>
+                </a:solidFill>
+                <a:latin typeface="Consolas" panose="020B0609020204030204" pitchFamily="49" charset="0"/>
+              </a:rPr>
+              <a:t>return</a:t>
+            </a:r>
+            <a:r>
+              <a:rPr lang="en-US" dirty="0">
+                <a:solidFill>
+                  <a:srgbClr val="D4D4D4"/>
+                </a:solidFill>
+                <a:latin typeface="Consolas" panose="020B0609020204030204" pitchFamily="49" charset="0"/>
+              </a:rPr>
+              <a:t> </a:t>
+            </a:r>
+            <a:r>
+              <a:rPr lang="en-US" dirty="0" err="1">
+                <a:solidFill>
+                  <a:srgbClr val="569CD6"/>
+                </a:solidFill>
+                <a:latin typeface="Consolas" panose="020B0609020204030204" pitchFamily="49" charset="0"/>
+              </a:rPr>
+              <a:t>this</a:t>
+            </a:r>
+            <a:r>
+              <a:rPr lang="en-US" dirty="0" err="1">
+                <a:solidFill>
+                  <a:srgbClr val="D4D4D4"/>
+                </a:solidFill>
+                <a:latin typeface="Consolas" panose="020B0609020204030204" pitchFamily="49" charset="0"/>
+              </a:rPr>
+              <a:t>.</a:t>
+            </a:r>
+            <a:r>
+              <a:rPr lang="en-US" dirty="0" err="1">
+                <a:solidFill>
+                  <a:srgbClr val="9CDCFE"/>
+                </a:solidFill>
+                <a:latin typeface="Consolas" panose="020B0609020204030204" pitchFamily="49" charset="0"/>
+              </a:rPr>
+              <a:t>http</a:t>
+            </a:r>
+            <a:r>
+              <a:rPr lang="en-US" dirty="0" err="1">
+                <a:solidFill>
+                  <a:srgbClr val="D4D4D4"/>
+                </a:solidFill>
+                <a:latin typeface="Consolas" panose="020B0609020204030204" pitchFamily="49" charset="0"/>
+              </a:rPr>
+              <a:t>.</a:t>
+            </a:r>
+            <a:r>
+              <a:rPr lang="en-US" dirty="0" err="1">
+                <a:solidFill>
+                  <a:srgbClr val="DCDCAA"/>
+                </a:solidFill>
+                <a:latin typeface="Consolas" panose="020B0609020204030204" pitchFamily="49" charset="0"/>
+              </a:rPr>
+              <a:t>get</a:t>
+            </a:r>
+            <a:r>
+              <a:rPr lang="en-US" dirty="0">
+                <a:solidFill>
+                  <a:srgbClr val="D4D4D4"/>
+                </a:solidFill>
+                <a:latin typeface="Consolas" panose="020B0609020204030204" pitchFamily="49" charset="0"/>
+              </a:rPr>
+              <a:t>&lt;</a:t>
+            </a:r>
+            <a:r>
+              <a:rPr lang="en-US" dirty="0" err="1">
+                <a:solidFill>
+                  <a:srgbClr val="4EC9B0"/>
+                </a:solidFill>
+                <a:latin typeface="Consolas" panose="020B0609020204030204" pitchFamily="49" charset="0"/>
+              </a:rPr>
+              <a:t>Todo</a:t>
+            </a:r>
+            <a:r>
+              <a:rPr lang="en-US" dirty="0">
+                <a:solidFill>
+                  <a:srgbClr val="D4D4D4"/>
+                </a:solidFill>
+                <a:latin typeface="Consolas" panose="020B0609020204030204" pitchFamily="49" charset="0"/>
+              </a:rPr>
+              <a:t>[]&gt;</a:t>
+            </a:r>
+          </a:p>
+          <a:p>
+            <a:pPr marL="457200" lvl="1" indent="0">
+              <a:buNone/>
+            </a:pPr>
+            <a:r>
+              <a:rPr lang="en-US" dirty="0">
+                <a:solidFill>
+                  <a:srgbClr val="D4D4D4"/>
+                </a:solidFill>
+                <a:latin typeface="Consolas" panose="020B0609020204030204" pitchFamily="49" charset="0"/>
+              </a:rPr>
+              <a:t>(</a:t>
+            </a:r>
+            <a:r>
+              <a:rPr lang="en-US" dirty="0">
+                <a:solidFill>
+                  <a:srgbClr val="CE9178"/>
+                </a:solidFill>
+                <a:latin typeface="Consolas" panose="020B0609020204030204" pitchFamily="49" charset="0"/>
+              </a:rPr>
+              <a:t>'http://localhost:8080/</a:t>
+            </a:r>
+            <a:r>
+              <a:rPr lang="en-US" dirty="0" err="1">
+                <a:solidFill>
+                  <a:srgbClr val="CE9178"/>
+                </a:solidFill>
+                <a:latin typeface="Consolas" panose="020B0609020204030204" pitchFamily="49" charset="0"/>
+              </a:rPr>
+              <a:t>api</a:t>
+            </a:r>
+            <a:r>
+              <a:rPr lang="en-US" dirty="0">
+                <a:solidFill>
+                  <a:srgbClr val="CE9178"/>
+                </a:solidFill>
+                <a:latin typeface="Consolas" panose="020B0609020204030204" pitchFamily="49" charset="0"/>
+              </a:rPr>
+              <a:t>/</a:t>
+            </a:r>
+            <a:r>
+              <a:rPr lang="en-US" dirty="0" err="1">
+                <a:solidFill>
+                  <a:srgbClr val="CE9178"/>
+                </a:solidFill>
+                <a:latin typeface="Consolas" panose="020B0609020204030204" pitchFamily="49" charset="0"/>
+              </a:rPr>
+              <a:t>todo</a:t>
+            </a:r>
+            <a:r>
+              <a:rPr lang="en-US" dirty="0">
+                <a:solidFill>
+                  <a:srgbClr val="CE9178"/>
+                </a:solidFill>
+                <a:latin typeface="Consolas" panose="020B0609020204030204" pitchFamily="49" charset="0"/>
+              </a:rPr>
+              <a:t>/uncompleted'</a:t>
+            </a:r>
+            <a:r>
+              <a:rPr lang="en-US" dirty="0">
+                <a:solidFill>
+                  <a:srgbClr val="D4D4D4"/>
+                </a:solidFill>
+                <a:latin typeface="Consolas" panose="020B0609020204030204" pitchFamily="49" charset="0"/>
+              </a:rPr>
+              <a:t>);</a:t>
+            </a:r>
+          </a:p>
+          <a:p>
+            <a:pPr marL="0" indent="0">
+              <a:buNone/>
+            </a:pPr>
+            <a:r>
+              <a:rPr lang="en-US" dirty="0">
+                <a:solidFill>
+                  <a:srgbClr val="D4D4D4"/>
+                </a:solidFill>
+                <a:latin typeface="Consolas" panose="020B0609020204030204" pitchFamily="49" charset="0"/>
+              </a:rPr>
+              <a:t>}</a:t>
+            </a:r>
+          </a:p>
+          <a:p>
+            <a:pPr marL="0" indent="0">
+              <a:buNone/>
+            </a:pPr>
+            <a:endParaRPr lang="en-NL" dirty="0"/>
+          </a:p>
+        </p:txBody>
+      </p:sp>
+    </p:spTree>
+    <p:extLst>
+      <p:ext uri="{BB962C8B-B14F-4D97-AF65-F5344CB8AC3E}">
+        <p14:creationId xmlns:p14="http://schemas.microsoft.com/office/powerpoint/2010/main" val="786961531"/>
+      </p:ext>
+    </p:extLst>
+  </p:cSld>
+  <p:clrMapOvr>
+    <a:masterClrMapping/>
+  </p:clrMapOvr>
+</p:sld>
+</file>
+
+<file path=ppt/slides/slide62.xml><?xml version="1.0" encoding="utf-8"?>
+<p:sld xmlns:a="http://schemas.openxmlformats.org/drawingml/2006/main" xmlns:r="http://schemas.openxmlformats.org/officeDocument/2006/relationships" xmlns:p="http://schemas.openxmlformats.org/presentationml/2006/main">
+  <p:cSld>
+    <p:spTree>
+      <p:nvGrpSpPr>
+        <p:cNvPr id="1" name=""/>
+        <p:cNvGrpSpPr/>
+        <p:nvPr/>
+      </p:nvGrpSpPr>
+      <p:grpSpPr>
+        <a:xfrm>
+          <a:off x="0" y="0"/>
+          <a:ext cx="0" cy="0"/>
+          <a:chOff x="0" y="0"/>
+          <a:chExt cx="0" cy="0"/>
+        </a:xfrm>
+      </p:grpSpPr>
+      <p:sp>
+        <p:nvSpPr>
+          <p:cNvPr id="2" name="Title 1">
+            <a:extLst>
+              <a:ext uri="{FF2B5EF4-FFF2-40B4-BE49-F238E27FC236}">
+                <a16:creationId xmlns:a16="http://schemas.microsoft.com/office/drawing/2014/main" id="{E05B1956-6567-457D-8482-4F380EE2D2BC}"/>
+              </a:ext>
+            </a:extLst>
+          </p:cNvPr>
+          <p:cNvSpPr>
+            <a:spLocks noGrp="1"/>
+          </p:cNvSpPr>
+          <p:nvPr>
+            <p:ph type="title"/>
+          </p:nvPr>
+        </p:nvSpPr>
+        <p:spPr/>
+        <p:txBody>
+          <a:bodyPr/>
+          <a:lstStyle/>
+          <a:p>
+            <a:r>
+              <a:rPr lang="en-US" dirty="0" err="1"/>
+              <a:t>todo-overview.component.ts</a:t>
+            </a:r>
+            <a:endParaRPr lang="en-NL" dirty="0"/>
+          </a:p>
+        </p:txBody>
+      </p:sp>
+      <p:sp>
+        <p:nvSpPr>
+          <p:cNvPr id="3" name="Content Placeholder 2">
+            <a:extLst>
+              <a:ext uri="{FF2B5EF4-FFF2-40B4-BE49-F238E27FC236}">
+                <a16:creationId xmlns:a16="http://schemas.microsoft.com/office/drawing/2014/main" id="{8CB84D93-DBBC-4186-99D1-440345F949C3}"/>
+              </a:ext>
+            </a:extLst>
+          </p:cNvPr>
+          <p:cNvSpPr>
+            <a:spLocks noGrp="1"/>
+          </p:cNvSpPr>
+          <p:nvPr>
+            <p:ph idx="1"/>
+          </p:nvPr>
+        </p:nvSpPr>
+        <p:spPr/>
+        <p:style>
+          <a:lnRef idx="0">
+            <a:scrgbClr r="0" g="0" b="0"/>
+          </a:lnRef>
+          <a:fillRef idx="1001">
+            <a:schemeClr val="dk2"/>
+          </a:fillRef>
+          <a:effectRef idx="0">
+            <a:scrgbClr r="0" g="0" b="0"/>
+          </a:effectRef>
+          <a:fontRef idx="major"/>
+        </p:style>
+        <p:txBody>
+          <a:bodyPr>
+            <a:normAutofit fontScale="85000" lnSpcReduction="20000"/>
+          </a:bodyPr>
+          <a:lstStyle/>
+          <a:p>
+            <a:pPr marL="0" indent="0">
+              <a:buNone/>
+            </a:pPr>
+            <a:r>
+              <a:rPr lang="en-US" dirty="0" err="1">
+                <a:solidFill>
+                  <a:srgbClr val="DCDCAA"/>
+                </a:solidFill>
+                <a:latin typeface="Consolas" panose="020B0609020204030204" pitchFamily="49" charset="0"/>
+              </a:rPr>
+              <a:t>ngOnInit</a:t>
+            </a:r>
+            <a:r>
+              <a:rPr lang="en-US" dirty="0">
+                <a:solidFill>
+                  <a:srgbClr val="D4D4D4"/>
+                </a:solidFill>
+                <a:latin typeface="Consolas" panose="020B0609020204030204" pitchFamily="49" charset="0"/>
+              </a:rPr>
+              <a:t>() {</a:t>
+            </a:r>
+          </a:p>
+          <a:p>
+            <a:pPr marL="0" indent="0">
+              <a:buNone/>
+            </a:pPr>
+            <a:r>
+              <a:rPr lang="en-US" dirty="0">
+                <a:solidFill>
+                  <a:srgbClr val="C586C0"/>
+                </a:solidFill>
+                <a:latin typeface="Consolas" panose="020B0609020204030204" pitchFamily="49" charset="0"/>
+              </a:rPr>
+              <a:t>	if</a:t>
+            </a:r>
+            <a:r>
+              <a:rPr lang="en-US" dirty="0">
+                <a:solidFill>
+                  <a:srgbClr val="D4D4D4"/>
+                </a:solidFill>
+                <a:latin typeface="Consolas" panose="020B0609020204030204" pitchFamily="49" charset="0"/>
+              </a:rPr>
+              <a:t> (</a:t>
+            </a:r>
+            <a:r>
+              <a:rPr lang="en-US" dirty="0" err="1">
+                <a:solidFill>
+                  <a:srgbClr val="569CD6"/>
+                </a:solidFill>
+                <a:latin typeface="Consolas" panose="020B0609020204030204" pitchFamily="49" charset="0"/>
+              </a:rPr>
+              <a:t>this</a:t>
+            </a:r>
+            <a:r>
+              <a:rPr lang="en-US" dirty="0" err="1">
+                <a:solidFill>
+                  <a:srgbClr val="D4D4D4"/>
+                </a:solidFill>
+                <a:latin typeface="Consolas" panose="020B0609020204030204" pitchFamily="49" charset="0"/>
+              </a:rPr>
+              <a:t>.</a:t>
+            </a:r>
+            <a:r>
+              <a:rPr lang="en-US" dirty="0" err="1">
+                <a:solidFill>
+                  <a:srgbClr val="9CDCFE"/>
+                </a:solidFill>
+                <a:latin typeface="Consolas" panose="020B0609020204030204" pitchFamily="49" charset="0"/>
+              </a:rPr>
+              <a:t>completed</a:t>
+            </a:r>
+            <a:r>
+              <a:rPr lang="en-US" dirty="0">
+                <a:solidFill>
+                  <a:srgbClr val="D4D4D4"/>
+                </a:solidFill>
+                <a:latin typeface="Consolas" panose="020B0609020204030204" pitchFamily="49" charset="0"/>
+              </a:rPr>
+              <a:t> === </a:t>
+            </a:r>
+            <a:r>
+              <a:rPr lang="en-US" dirty="0">
+                <a:solidFill>
+                  <a:srgbClr val="569CD6"/>
+                </a:solidFill>
+                <a:latin typeface="Consolas" panose="020B0609020204030204" pitchFamily="49" charset="0"/>
+              </a:rPr>
+              <a:t>false</a:t>
+            </a:r>
+            <a:r>
+              <a:rPr lang="en-US" dirty="0">
+                <a:solidFill>
+                  <a:srgbClr val="D4D4D4"/>
+                </a:solidFill>
+                <a:latin typeface="Consolas" panose="020B0609020204030204" pitchFamily="49" charset="0"/>
+              </a:rPr>
+              <a:t>) {</a:t>
+            </a:r>
+          </a:p>
+          <a:p>
+            <a:pPr marL="0" indent="0">
+              <a:buNone/>
+            </a:pPr>
+            <a:r>
+              <a:rPr lang="en-US" dirty="0">
+                <a:solidFill>
+                  <a:srgbClr val="569CD6"/>
+                </a:solidFill>
+                <a:latin typeface="Consolas" panose="020B0609020204030204" pitchFamily="49" charset="0"/>
+              </a:rPr>
+              <a:t>		</a:t>
+            </a:r>
+            <a:r>
+              <a:rPr lang="en-US" dirty="0" err="1">
+                <a:solidFill>
+                  <a:srgbClr val="569CD6"/>
+                </a:solidFill>
+                <a:latin typeface="Consolas" panose="020B0609020204030204" pitchFamily="49" charset="0"/>
+              </a:rPr>
+              <a:t>this</a:t>
+            </a:r>
+            <a:r>
+              <a:rPr lang="en-US" dirty="0" err="1">
+                <a:solidFill>
+                  <a:srgbClr val="D4D4D4"/>
+                </a:solidFill>
+                <a:latin typeface="Consolas" panose="020B0609020204030204" pitchFamily="49" charset="0"/>
+              </a:rPr>
+              <a:t>.</a:t>
+            </a:r>
+            <a:r>
+              <a:rPr lang="en-US" dirty="0" err="1">
+                <a:solidFill>
+                  <a:srgbClr val="DCDCAA"/>
+                </a:solidFill>
+                <a:latin typeface="Consolas" panose="020B0609020204030204" pitchFamily="49" charset="0"/>
+              </a:rPr>
+              <a:t>getUncompletedToDos</a:t>
+            </a:r>
+            <a:r>
+              <a:rPr lang="en-US" dirty="0">
+                <a:solidFill>
+                  <a:srgbClr val="D4D4D4"/>
+                </a:solidFill>
+                <a:latin typeface="Consolas" panose="020B0609020204030204" pitchFamily="49" charset="0"/>
+              </a:rPr>
+              <a:t>();</a:t>
+            </a:r>
+          </a:p>
+          <a:p>
+            <a:pPr marL="0" indent="0">
+              <a:buNone/>
+            </a:pPr>
+            <a:r>
+              <a:rPr lang="en-US" dirty="0">
+                <a:solidFill>
+                  <a:srgbClr val="D4D4D4"/>
+                </a:solidFill>
+                <a:latin typeface="Consolas" panose="020B0609020204030204" pitchFamily="49" charset="0"/>
+              </a:rPr>
+              <a:t>	}</a:t>
+            </a:r>
+          </a:p>
+          <a:p>
+            <a:pPr marL="0" indent="0">
+              <a:buNone/>
+            </a:pPr>
+            <a:r>
+              <a:rPr lang="en-US" dirty="0">
+                <a:solidFill>
+                  <a:srgbClr val="C586C0"/>
+                </a:solidFill>
+                <a:latin typeface="Consolas" panose="020B0609020204030204" pitchFamily="49" charset="0"/>
+              </a:rPr>
+              <a:t>	else</a:t>
+            </a:r>
+            <a:r>
+              <a:rPr lang="en-US" dirty="0">
+                <a:solidFill>
+                  <a:srgbClr val="D4D4D4"/>
+                </a:solidFill>
+                <a:latin typeface="Consolas" panose="020B0609020204030204" pitchFamily="49" charset="0"/>
+              </a:rPr>
+              <a:t> </a:t>
+            </a:r>
+            <a:r>
+              <a:rPr lang="en-US" dirty="0">
+                <a:solidFill>
+                  <a:srgbClr val="C586C0"/>
+                </a:solidFill>
+                <a:latin typeface="Consolas" panose="020B0609020204030204" pitchFamily="49" charset="0"/>
+              </a:rPr>
+              <a:t>if</a:t>
+            </a:r>
+            <a:r>
+              <a:rPr lang="en-US" dirty="0">
+                <a:solidFill>
+                  <a:srgbClr val="D4D4D4"/>
+                </a:solidFill>
+                <a:latin typeface="Consolas" panose="020B0609020204030204" pitchFamily="49" charset="0"/>
+              </a:rPr>
+              <a:t> (</a:t>
+            </a:r>
+            <a:r>
+              <a:rPr lang="en-US" dirty="0" err="1">
+                <a:solidFill>
+                  <a:srgbClr val="569CD6"/>
+                </a:solidFill>
+                <a:latin typeface="Consolas" panose="020B0609020204030204" pitchFamily="49" charset="0"/>
+              </a:rPr>
+              <a:t>this</a:t>
+            </a:r>
+            <a:r>
+              <a:rPr lang="en-US" dirty="0" err="1">
+                <a:solidFill>
+                  <a:srgbClr val="D4D4D4"/>
+                </a:solidFill>
+                <a:latin typeface="Consolas" panose="020B0609020204030204" pitchFamily="49" charset="0"/>
+              </a:rPr>
+              <a:t>.</a:t>
+            </a:r>
+            <a:r>
+              <a:rPr lang="en-US" dirty="0" err="1">
+                <a:solidFill>
+                  <a:srgbClr val="9CDCFE"/>
+                </a:solidFill>
+                <a:latin typeface="Consolas" panose="020B0609020204030204" pitchFamily="49" charset="0"/>
+              </a:rPr>
+              <a:t>completed</a:t>
+            </a:r>
+            <a:r>
+              <a:rPr lang="en-US" dirty="0">
+                <a:solidFill>
+                  <a:srgbClr val="D4D4D4"/>
+                </a:solidFill>
+                <a:latin typeface="Consolas" panose="020B0609020204030204" pitchFamily="49" charset="0"/>
+              </a:rPr>
+              <a:t> === </a:t>
+            </a:r>
+            <a:r>
+              <a:rPr lang="en-US" dirty="0">
+                <a:solidFill>
+                  <a:srgbClr val="569CD6"/>
+                </a:solidFill>
+                <a:latin typeface="Consolas" panose="020B0609020204030204" pitchFamily="49" charset="0"/>
+              </a:rPr>
+              <a:t>true</a:t>
+            </a:r>
+            <a:r>
+              <a:rPr lang="en-US" dirty="0">
+                <a:solidFill>
+                  <a:srgbClr val="D4D4D4"/>
+                </a:solidFill>
+                <a:latin typeface="Consolas" panose="020B0609020204030204" pitchFamily="49" charset="0"/>
+              </a:rPr>
+              <a:t>) {</a:t>
+            </a:r>
+          </a:p>
+          <a:p>
+            <a:pPr marL="0" indent="0">
+              <a:buNone/>
+            </a:pPr>
+            <a:r>
+              <a:rPr lang="en-US" dirty="0">
+                <a:solidFill>
+                  <a:srgbClr val="569CD6"/>
+                </a:solidFill>
+                <a:latin typeface="Consolas" panose="020B0609020204030204" pitchFamily="49" charset="0"/>
+              </a:rPr>
+              <a:t>		</a:t>
+            </a:r>
+            <a:r>
+              <a:rPr lang="en-US" dirty="0" err="1">
+                <a:solidFill>
+                  <a:srgbClr val="569CD6"/>
+                </a:solidFill>
+                <a:latin typeface="Consolas" panose="020B0609020204030204" pitchFamily="49" charset="0"/>
+              </a:rPr>
+              <a:t>this</a:t>
+            </a:r>
+            <a:r>
+              <a:rPr lang="en-US" dirty="0" err="1">
+                <a:solidFill>
+                  <a:srgbClr val="D4D4D4"/>
+                </a:solidFill>
+                <a:latin typeface="Consolas" panose="020B0609020204030204" pitchFamily="49" charset="0"/>
+              </a:rPr>
+              <a:t>.</a:t>
+            </a:r>
+            <a:r>
+              <a:rPr lang="en-US" dirty="0" err="1">
+                <a:solidFill>
+                  <a:srgbClr val="DCDCAA"/>
+                </a:solidFill>
+                <a:latin typeface="Consolas" panose="020B0609020204030204" pitchFamily="49" charset="0"/>
+              </a:rPr>
+              <a:t>getCompletedToDos</a:t>
+            </a:r>
+            <a:r>
+              <a:rPr lang="en-US" dirty="0">
+                <a:solidFill>
+                  <a:srgbClr val="D4D4D4"/>
+                </a:solidFill>
+                <a:latin typeface="Consolas" panose="020B0609020204030204" pitchFamily="49" charset="0"/>
+              </a:rPr>
+              <a:t>();</a:t>
+            </a:r>
+          </a:p>
+          <a:p>
+            <a:pPr marL="0" indent="0">
+              <a:buNone/>
+            </a:pPr>
+            <a:r>
+              <a:rPr lang="en-US" dirty="0">
+                <a:solidFill>
+                  <a:srgbClr val="D4D4D4"/>
+                </a:solidFill>
+                <a:latin typeface="Consolas" panose="020B0609020204030204" pitchFamily="49" charset="0"/>
+              </a:rPr>
+              <a:t>	}</a:t>
+            </a:r>
+          </a:p>
+          <a:p>
+            <a:pPr marL="0" indent="0">
+              <a:buNone/>
+            </a:pPr>
+            <a:r>
+              <a:rPr lang="en-US" dirty="0">
+                <a:solidFill>
+                  <a:srgbClr val="C586C0"/>
+                </a:solidFill>
+                <a:latin typeface="Consolas" panose="020B0609020204030204" pitchFamily="49" charset="0"/>
+              </a:rPr>
+              <a:t>	else</a:t>
+            </a:r>
+            <a:r>
+              <a:rPr lang="en-US" dirty="0">
+                <a:solidFill>
+                  <a:srgbClr val="D4D4D4"/>
+                </a:solidFill>
+                <a:latin typeface="Consolas" panose="020B0609020204030204" pitchFamily="49" charset="0"/>
+              </a:rPr>
+              <a:t> {</a:t>
+            </a:r>
+          </a:p>
+          <a:p>
+            <a:pPr marL="0" indent="0">
+              <a:buNone/>
+            </a:pPr>
+            <a:r>
+              <a:rPr lang="en-US" dirty="0">
+                <a:solidFill>
+                  <a:srgbClr val="569CD6"/>
+                </a:solidFill>
+                <a:latin typeface="Consolas" panose="020B0609020204030204" pitchFamily="49" charset="0"/>
+              </a:rPr>
+              <a:t>		</a:t>
+            </a:r>
+            <a:r>
+              <a:rPr lang="en-US" dirty="0" err="1">
+                <a:solidFill>
+                  <a:srgbClr val="569CD6"/>
+                </a:solidFill>
+                <a:latin typeface="Consolas" panose="020B0609020204030204" pitchFamily="49" charset="0"/>
+              </a:rPr>
+              <a:t>this</a:t>
+            </a:r>
+            <a:r>
+              <a:rPr lang="en-US" dirty="0" err="1">
+                <a:solidFill>
+                  <a:srgbClr val="D4D4D4"/>
+                </a:solidFill>
+                <a:latin typeface="Consolas" panose="020B0609020204030204" pitchFamily="49" charset="0"/>
+              </a:rPr>
+              <a:t>.</a:t>
+            </a:r>
+            <a:r>
+              <a:rPr lang="en-US" dirty="0" err="1">
+                <a:solidFill>
+                  <a:srgbClr val="DCDCAA"/>
+                </a:solidFill>
+                <a:latin typeface="Consolas" panose="020B0609020204030204" pitchFamily="49" charset="0"/>
+              </a:rPr>
+              <a:t>getToDos</a:t>
+            </a:r>
+            <a:r>
+              <a:rPr lang="en-US" dirty="0">
+                <a:solidFill>
+                  <a:srgbClr val="D4D4D4"/>
+                </a:solidFill>
+                <a:latin typeface="Consolas" panose="020B0609020204030204" pitchFamily="49" charset="0"/>
+              </a:rPr>
+              <a:t>();</a:t>
+            </a:r>
+          </a:p>
+          <a:p>
+            <a:pPr marL="0" indent="0">
+              <a:buNone/>
+            </a:pPr>
+            <a:r>
+              <a:rPr lang="en-US" dirty="0">
+                <a:solidFill>
+                  <a:srgbClr val="D4D4D4"/>
+                </a:solidFill>
+                <a:latin typeface="Consolas" panose="020B0609020204030204" pitchFamily="49" charset="0"/>
+              </a:rPr>
+              <a:t>	}</a:t>
+            </a:r>
+          </a:p>
+          <a:p>
+            <a:pPr marL="0" indent="0">
+              <a:buNone/>
+            </a:pPr>
+            <a:r>
+              <a:rPr lang="en-US" dirty="0">
+                <a:solidFill>
+                  <a:srgbClr val="D4D4D4"/>
+                </a:solidFill>
+                <a:latin typeface="Consolas" panose="020B0609020204030204" pitchFamily="49" charset="0"/>
+              </a:rPr>
+              <a:t>}</a:t>
+            </a:r>
+          </a:p>
+          <a:p>
+            <a:pPr marL="0" indent="0">
+              <a:buNone/>
+            </a:pPr>
+            <a:endParaRPr lang="en-US" dirty="0">
+              <a:solidFill>
+                <a:srgbClr val="D4D4D4"/>
+              </a:solidFill>
+              <a:latin typeface="Consolas" panose="020B0609020204030204" pitchFamily="49" charset="0"/>
+            </a:endParaRPr>
+          </a:p>
+          <a:p>
+            <a:endParaRPr lang="en-NL" dirty="0"/>
+          </a:p>
+        </p:txBody>
+      </p:sp>
+    </p:spTree>
+    <p:extLst>
+      <p:ext uri="{BB962C8B-B14F-4D97-AF65-F5344CB8AC3E}">
+        <p14:creationId xmlns:p14="http://schemas.microsoft.com/office/powerpoint/2010/main" val="447570839"/>
+      </p:ext>
+    </p:extLst>
+  </p:cSld>
+  <p:clrMapOvr>
+    <a:masterClrMapping/>
+  </p:clrMapOvr>
+</p:sld>
+</file>
+
+<file path=ppt/slides/slide63.xml><?xml version="1.0" encoding="utf-8"?>
+<p:sld xmlns:a="http://schemas.openxmlformats.org/drawingml/2006/main" xmlns:r="http://schemas.openxmlformats.org/officeDocument/2006/relationships" xmlns:p="http://schemas.openxmlformats.org/presentationml/2006/main">
+  <p:cSld>
+    <p:spTree>
+      <p:nvGrpSpPr>
+        <p:cNvPr id="1" name=""/>
+        <p:cNvGrpSpPr/>
+        <p:nvPr/>
+      </p:nvGrpSpPr>
+      <p:grpSpPr>
+        <a:xfrm>
+          <a:off x="0" y="0"/>
+          <a:ext cx="0" cy="0"/>
+          <a:chOff x="0" y="0"/>
+          <a:chExt cx="0" cy="0"/>
+        </a:xfrm>
+      </p:grpSpPr>
+      <p:sp>
+        <p:nvSpPr>
+          <p:cNvPr id="2" name="Title 1">
+            <a:extLst>
+              <a:ext uri="{FF2B5EF4-FFF2-40B4-BE49-F238E27FC236}">
+                <a16:creationId xmlns:a16="http://schemas.microsoft.com/office/drawing/2014/main" id="{8D41EF72-0FE7-4202-BA84-CADAC9126036}"/>
+              </a:ext>
+            </a:extLst>
+          </p:cNvPr>
+          <p:cNvSpPr>
+            <a:spLocks noGrp="1"/>
+          </p:cNvSpPr>
+          <p:nvPr>
+            <p:ph type="title"/>
+          </p:nvPr>
+        </p:nvSpPr>
+        <p:spPr/>
+        <p:txBody>
+          <a:bodyPr/>
+          <a:lstStyle/>
+          <a:p>
+            <a:r>
+              <a:rPr lang="en-US" dirty="0" err="1"/>
+              <a:t>todo-overview.component.ts</a:t>
+            </a:r>
+            <a:endParaRPr lang="en-NL" dirty="0"/>
+          </a:p>
+        </p:txBody>
+      </p:sp>
+      <p:sp>
+        <p:nvSpPr>
+          <p:cNvPr id="3" name="Content Placeholder 2">
+            <a:extLst>
+              <a:ext uri="{FF2B5EF4-FFF2-40B4-BE49-F238E27FC236}">
+                <a16:creationId xmlns:a16="http://schemas.microsoft.com/office/drawing/2014/main" id="{1BAFEFF6-605D-4BAE-9EDB-D780BF2FCCF4}"/>
+              </a:ext>
+            </a:extLst>
+          </p:cNvPr>
+          <p:cNvSpPr>
+            <a:spLocks noGrp="1"/>
+          </p:cNvSpPr>
+          <p:nvPr>
+            <p:ph idx="1"/>
+          </p:nvPr>
+        </p:nvSpPr>
+        <p:spPr/>
+        <p:style>
+          <a:lnRef idx="0">
+            <a:scrgbClr r="0" g="0" b="0"/>
+          </a:lnRef>
+          <a:fillRef idx="1001">
+            <a:schemeClr val="dk2"/>
+          </a:fillRef>
+          <a:effectRef idx="0">
+            <a:scrgbClr r="0" g="0" b="0"/>
+          </a:effectRef>
+          <a:fontRef idx="major"/>
+        </p:style>
+        <p:txBody>
+          <a:bodyPr>
+            <a:normAutofit fontScale="92500" lnSpcReduction="20000"/>
+          </a:bodyPr>
+          <a:lstStyle/>
+          <a:p>
+            <a:pPr marL="0" indent="0">
+              <a:buNone/>
+            </a:pPr>
+            <a:r>
+              <a:rPr lang="en-US" dirty="0" err="1">
+                <a:solidFill>
+                  <a:srgbClr val="DCDCAA"/>
+                </a:solidFill>
+                <a:latin typeface="Consolas" panose="020B0609020204030204" pitchFamily="49" charset="0"/>
+              </a:rPr>
+              <a:t>getCompletedToDos</a:t>
+            </a:r>
+            <a:r>
+              <a:rPr lang="en-US" dirty="0">
+                <a:solidFill>
+                  <a:srgbClr val="D4D4D4"/>
+                </a:solidFill>
+                <a:latin typeface="Consolas" panose="020B0609020204030204" pitchFamily="49" charset="0"/>
+              </a:rPr>
+              <a:t>() {</a:t>
+            </a:r>
+          </a:p>
+          <a:p>
+            <a:pPr marL="0" indent="0">
+              <a:buNone/>
+            </a:pPr>
+            <a:r>
+              <a:rPr lang="en-US" dirty="0">
+                <a:solidFill>
+                  <a:srgbClr val="569CD6"/>
+                </a:solidFill>
+                <a:latin typeface="Consolas" panose="020B0609020204030204" pitchFamily="49" charset="0"/>
+              </a:rPr>
+              <a:t>	</a:t>
+            </a:r>
+            <a:r>
+              <a:rPr lang="en-US" dirty="0" err="1">
+                <a:solidFill>
+                  <a:srgbClr val="569CD6"/>
+                </a:solidFill>
+                <a:latin typeface="Consolas" panose="020B0609020204030204" pitchFamily="49" charset="0"/>
+              </a:rPr>
+              <a:t>this</a:t>
+            </a:r>
+            <a:r>
+              <a:rPr lang="en-US" dirty="0" err="1">
+                <a:solidFill>
+                  <a:srgbClr val="D4D4D4"/>
+                </a:solidFill>
+                <a:latin typeface="Consolas" panose="020B0609020204030204" pitchFamily="49" charset="0"/>
+              </a:rPr>
+              <a:t>.</a:t>
+            </a:r>
+            <a:r>
+              <a:rPr lang="en-US" dirty="0" err="1">
+                <a:solidFill>
+                  <a:srgbClr val="9CDCFE"/>
+                </a:solidFill>
+                <a:latin typeface="Consolas" panose="020B0609020204030204" pitchFamily="49" charset="0"/>
+              </a:rPr>
+              <a:t>todoService</a:t>
+            </a:r>
+            <a:r>
+              <a:rPr lang="en-US" dirty="0" err="1">
+                <a:solidFill>
+                  <a:srgbClr val="D4D4D4"/>
+                </a:solidFill>
+                <a:latin typeface="Consolas" panose="020B0609020204030204" pitchFamily="49" charset="0"/>
+              </a:rPr>
+              <a:t>.</a:t>
+            </a:r>
+            <a:r>
+              <a:rPr lang="en-US" dirty="0" err="1">
+                <a:solidFill>
+                  <a:srgbClr val="DCDCAA"/>
+                </a:solidFill>
+                <a:latin typeface="Consolas" panose="020B0609020204030204" pitchFamily="49" charset="0"/>
+              </a:rPr>
+              <a:t>getCompletedToDos</a:t>
+            </a:r>
+            <a:r>
+              <a:rPr lang="en-US" dirty="0">
+                <a:solidFill>
+                  <a:srgbClr val="D4D4D4"/>
+                </a:solidFill>
+                <a:latin typeface="Consolas" panose="020B0609020204030204" pitchFamily="49" charset="0"/>
+              </a:rPr>
+              <a:t>().</a:t>
+            </a:r>
+            <a:r>
+              <a:rPr lang="en-US" dirty="0">
+                <a:solidFill>
+                  <a:srgbClr val="DCDCAA"/>
+                </a:solidFill>
+                <a:latin typeface="Consolas" panose="020B0609020204030204" pitchFamily="49" charset="0"/>
+              </a:rPr>
+              <a:t>subscribe</a:t>
+            </a:r>
+            <a:r>
+              <a:rPr lang="en-US" dirty="0">
+                <a:solidFill>
+                  <a:srgbClr val="D4D4D4"/>
+                </a:solidFill>
+                <a:latin typeface="Consolas" panose="020B0609020204030204" pitchFamily="49" charset="0"/>
+              </a:rPr>
+              <a:t>(</a:t>
+            </a:r>
+          </a:p>
+          <a:p>
+            <a:pPr marL="0" indent="0">
+              <a:buNone/>
+            </a:pPr>
+            <a:r>
+              <a:rPr lang="en-US" dirty="0">
+                <a:solidFill>
+                  <a:srgbClr val="9CDCFE"/>
+                </a:solidFill>
+                <a:latin typeface="Consolas" panose="020B0609020204030204" pitchFamily="49" charset="0"/>
+              </a:rPr>
+              <a:t>		data</a:t>
+            </a:r>
+            <a:r>
+              <a:rPr lang="en-US" dirty="0">
+                <a:solidFill>
+                  <a:srgbClr val="D4D4D4"/>
+                </a:solidFill>
+                <a:latin typeface="Consolas" panose="020B0609020204030204" pitchFamily="49" charset="0"/>
+              </a:rPr>
+              <a:t> </a:t>
+            </a:r>
+            <a:r>
+              <a:rPr lang="en-US" dirty="0">
+                <a:solidFill>
+                  <a:srgbClr val="569CD6"/>
+                </a:solidFill>
+                <a:latin typeface="Consolas" panose="020B0609020204030204" pitchFamily="49" charset="0"/>
+              </a:rPr>
+              <a:t>=&gt;</a:t>
+            </a:r>
+            <a:r>
+              <a:rPr lang="en-US" dirty="0">
+                <a:solidFill>
+                  <a:srgbClr val="D4D4D4"/>
+                </a:solidFill>
+                <a:latin typeface="Consolas" panose="020B0609020204030204" pitchFamily="49" charset="0"/>
+              </a:rPr>
+              <a:t> {</a:t>
+            </a:r>
+          </a:p>
+          <a:p>
+            <a:pPr marL="0" indent="0">
+              <a:buNone/>
+            </a:pPr>
+            <a:r>
+              <a:rPr lang="en-US" dirty="0">
+                <a:solidFill>
+                  <a:srgbClr val="569CD6"/>
+                </a:solidFill>
+                <a:latin typeface="Consolas" panose="020B0609020204030204" pitchFamily="49" charset="0"/>
+              </a:rPr>
+              <a:t>			</a:t>
+            </a:r>
+            <a:r>
+              <a:rPr lang="en-US" dirty="0" err="1">
+                <a:solidFill>
+                  <a:srgbClr val="569CD6"/>
+                </a:solidFill>
+                <a:latin typeface="Consolas" panose="020B0609020204030204" pitchFamily="49" charset="0"/>
+              </a:rPr>
+              <a:t>this</a:t>
+            </a:r>
+            <a:r>
+              <a:rPr lang="en-US" dirty="0" err="1">
+                <a:solidFill>
+                  <a:srgbClr val="D4D4D4"/>
+                </a:solidFill>
+                <a:latin typeface="Consolas" panose="020B0609020204030204" pitchFamily="49" charset="0"/>
+              </a:rPr>
+              <a:t>.</a:t>
+            </a:r>
+            <a:r>
+              <a:rPr lang="en-US" dirty="0" err="1">
+                <a:solidFill>
+                  <a:srgbClr val="9CDCFE"/>
+                </a:solidFill>
+                <a:latin typeface="Consolas" panose="020B0609020204030204" pitchFamily="49" charset="0"/>
+              </a:rPr>
+              <a:t>todos</a:t>
+            </a:r>
+            <a:r>
+              <a:rPr lang="en-US" dirty="0">
+                <a:solidFill>
+                  <a:srgbClr val="D4D4D4"/>
+                </a:solidFill>
+                <a:latin typeface="Consolas" panose="020B0609020204030204" pitchFamily="49" charset="0"/>
+              </a:rPr>
+              <a:t> = </a:t>
+            </a:r>
+            <a:r>
+              <a:rPr lang="en-US" dirty="0">
+                <a:solidFill>
+                  <a:srgbClr val="9CDCFE"/>
+                </a:solidFill>
+                <a:latin typeface="Consolas" panose="020B0609020204030204" pitchFamily="49" charset="0"/>
+              </a:rPr>
+              <a:t>data</a:t>
+            </a:r>
+            <a:r>
+              <a:rPr lang="en-US" dirty="0">
+                <a:solidFill>
+                  <a:srgbClr val="D4D4D4"/>
+                </a:solidFill>
+                <a:latin typeface="Consolas" panose="020B0609020204030204" pitchFamily="49" charset="0"/>
+              </a:rPr>
+              <a:t>;</a:t>
+            </a:r>
+          </a:p>
+          <a:p>
+            <a:pPr marL="0" indent="0">
+              <a:buNone/>
+            </a:pPr>
+            <a:r>
+              <a:rPr lang="en-US" dirty="0">
+                <a:solidFill>
+                  <a:srgbClr val="D4D4D4"/>
+                </a:solidFill>
+                <a:latin typeface="Consolas" panose="020B0609020204030204" pitchFamily="49" charset="0"/>
+              </a:rPr>
+              <a:t>		},</a:t>
+            </a:r>
+          </a:p>
+          <a:p>
+            <a:pPr marL="0" indent="0">
+              <a:buNone/>
+            </a:pPr>
+            <a:r>
+              <a:rPr lang="en-US" dirty="0">
+                <a:solidFill>
+                  <a:srgbClr val="9CDCFE"/>
+                </a:solidFill>
+                <a:latin typeface="Consolas" panose="020B0609020204030204" pitchFamily="49" charset="0"/>
+              </a:rPr>
+              <a:t>		err</a:t>
+            </a:r>
+            <a:r>
+              <a:rPr lang="en-US" dirty="0">
+                <a:solidFill>
+                  <a:srgbClr val="D4D4D4"/>
+                </a:solidFill>
+                <a:latin typeface="Consolas" panose="020B0609020204030204" pitchFamily="49" charset="0"/>
+              </a:rPr>
+              <a:t> </a:t>
+            </a:r>
+            <a:r>
+              <a:rPr lang="en-US" dirty="0">
+                <a:solidFill>
+                  <a:srgbClr val="569CD6"/>
+                </a:solidFill>
+                <a:latin typeface="Consolas" panose="020B0609020204030204" pitchFamily="49" charset="0"/>
+              </a:rPr>
+              <a:t>=&gt;</a:t>
+            </a:r>
+            <a:r>
+              <a:rPr lang="en-US" dirty="0">
+                <a:solidFill>
+                  <a:srgbClr val="D4D4D4"/>
+                </a:solidFill>
+                <a:latin typeface="Consolas" panose="020B0609020204030204" pitchFamily="49" charset="0"/>
+              </a:rPr>
+              <a:t> {</a:t>
+            </a:r>
+          </a:p>
+          <a:p>
+            <a:pPr marL="0" indent="0">
+              <a:buNone/>
+            </a:pPr>
+            <a:r>
+              <a:rPr lang="en-US" dirty="0">
+                <a:solidFill>
+                  <a:srgbClr val="DCDCAA"/>
+                </a:solidFill>
+                <a:latin typeface="Consolas" panose="020B0609020204030204" pitchFamily="49" charset="0"/>
+              </a:rPr>
+              <a:t>			alert</a:t>
+            </a:r>
+            <a:r>
+              <a:rPr lang="en-US" dirty="0">
+                <a:solidFill>
+                  <a:srgbClr val="D4D4D4"/>
+                </a:solidFill>
+                <a:latin typeface="Consolas" panose="020B0609020204030204" pitchFamily="49" charset="0"/>
+              </a:rPr>
+              <a:t>(</a:t>
+            </a:r>
+            <a:r>
+              <a:rPr lang="en-US" dirty="0">
+                <a:solidFill>
+                  <a:srgbClr val="CE9178"/>
+                </a:solidFill>
+                <a:latin typeface="Consolas" panose="020B0609020204030204" pitchFamily="49" charset="0"/>
+              </a:rPr>
+              <a:t>'Something went wrong!’</a:t>
+            </a:r>
+            <a:r>
+              <a:rPr lang="en-US" dirty="0">
+                <a:solidFill>
+                  <a:srgbClr val="D4D4D4"/>
+                </a:solidFill>
+                <a:latin typeface="Consolas" panose="020B0609020204030204" pitchFamily="49" charset="0"/>
+              </a:rPr>
+              <a:t>);</a:t>
+            </a:r>
+          </a:p>
+          <a:p>
+            <a:pPr marL="0" indent="0">
+              <a:buNone/>
+            </a:pPr>
+            <a:r>
+              <a:rPr lang="en-US" dirty="0">
+                <a:solidFill>
+                  <a:srgbClr val="D4D4D4"/>
+                </a:solidFill>
+                <a:latin typeface="Consolas" panose="020B0609020204030204" pitchFamily="49" charset="0"/>
+              </a:rPr>
+              <a:t>		}</a:t>
+            </a:r>
+          </a:p>
+          <a:p>
+            <a:pPr marL="0" indent="0">
+              <a:buNone/>
+            </a:pPr>
+            <a:r>
+              <a:rPr lang="en-US" dirty="0">
+                <a:solidFill>
+                  <a:srgbClr val="D4D4D4"/>
+                </a:solidFill>
+                <a:latin typeface="Consolas" panose="020B0609020204030204" pitchFamily="49" charset="0"/>
+              </a:rPr>
+              <a:t>	);</a:t>
+            </a:r>
+          </a:p>
+          <a:p>
+            <a:pPr marL="0" indent="0">
+              <a:buNone/>
+            </a:pPr>
+            <a:r>
+              <a:rPr lang="en-US" dirty="0">
+                <a:solidFill>
+                  <a:srgbClr val="D4D4D4"/>
+                </a:solidFill>
+                <a:latin typeface="Consolas" panose="020B0609020204030204" pitchFamily="49" charset="0"/>
+              </a:rPr>
+              <a:t>}</a:t>
+            </a:r>
+          </a:p>
+        </p:txBody>
+      </p:sp>
+    </p:spTree>
+    <p:extLst>
+      <p:ext uri="{BB962C8B-B14F-4D97-AF65-F5344CB8AC3E}">
+        <p14:creationId xmlns:p14="http://schemas.microsoft.com/office/powerpoint/2010/main" val="3793791890"/>
+      </p:ext>
+    </p:extLst>
+  </p:cSld>
+  <p:clrMapOvr>
+    <a:masterClrMapping/>
+  </p:clrMapOvr>
+</p:sld>
+</file>
+
+<file path=ppt/slides/slide64.xml><?xml version="1.0" encoding="utf-8"?>
+<p:sld xmlns:a="http://schemas.openxmlformats.org/drawingml/2006/main" xmlns:r="http://schemas.openxmlformats.org/officeDocument/2006/relationships" xmlns:p="http://schemas.openxmlformats.org/presentationml/2006/main">
+  <p:cSld>
+    <p:spTree>
+      <p:nvGrpSpPr>
+        <p:cNvPr id="1" name=""/>
+        <p:cNvGrpSpPr/>
+        <p:nvPr/>
+      </p:nvGrpSpPr>
+      <p:grpSpPr>
+        <a:xfrm>
+          <a:off x="0" y="0"/>
+          <a:ext cx="0" cy="0"/>
+          <a:chOff x="0" y="0"/>
+          <a:chExt cx="0" cy="0"/>
+        </a:xfrm>
+      </p:grpSpPr>
+      <p:sp>
+        <p:nvSpPr>
+          <p:cNvPr id="2" name="Title 1">
+            <a:extLst>
+              <a:ext uri="{FF2B5EF4-FFF2-40B4-BE49-F238E27FC236}">
+                <a16:creationId xmlns:a16="http://schemas.microsoft.com/office/drawing/2014/main" id="{8D41EF72-0FE7-4202-BA84-CADAC9126036}"/>
+              </a:ext>
+            </a:extLst>
+          </p:cNvPr>
+          <p:cNvSpPr>
+            <a:spLocks noGrp="1"/>
+          </p:cNvSpPr>
+          <p:nvPr>
+            <p:ph type="title"/>
+          </p:nvPr>
+        </p:nvSpPr>
+        <p:spPr/>
+        <p:txBody>
+          <a:bodyPr/>
+          <a:lstStyle/>
+          <a:p>
+            <a:r>
+              <a:rPr lang="en-US" dirty="0" err="1"/>
+              <a:t>todo-overview.component.ts</a:t>
+            </a:r>
+            <a:endParaRPr lang="en-NL" dirty="0"/>
+          </a:p>
+        </p:txBody>
+      </p:sp>
+      <p:sp>
+        <p:nvSpPr>
+          <p:cNvPr id="3" name="Content Placeholder 2">
+            <a:extLst>
+              <a:ext uri="{FF2B5EF4-FFF2-40B4-BE49-F238E27FC236}">
+                <a16:creationId xmlns:a16="http://schemas.microsoft.com/office/drawing/2014/main" id="{1BAFEFF6-605D-4BAE-9EDB-D780BF2FCCF4}"/>
+              </a:ext>
+            </a:extLst>
+          </p:cNvPr>
+          <p:cNvSpPr>
+            <a:spLocks noGrp="1"/>
+          </p:cNvSpPr>
+          <p:nvPr>
+            <p:ph idx="1"/>
+          </p:nvPr>
+        </p:nvSpPr>
+        <p:spPr/>
+        <p:style>
+          <a:lnRef idx="0">
+            <a:scrgbClr r="0" g="0" b="0"/>
+          </a:lnRef>
+          <a:fillRef idx="1001">
+            <a:schemeClr val="dk2"/>
+          </a:fillRef>
+          <a:effectRef idx="0">
+            <a:scrgbClr r="0" g="0" b="0"/>
+          </a:effectRef>
+          <a:fontRef idx="major"/>
+        </p:style>
+        <p:txBody>
+          <a:bodyPr>
+            <a:normAutofit fontScale="92500" lnSpcReduction="20000"/>
+          </a:bodyPr>
+          <a:lstStyle/>
+          <a:p>
+            <a:pPr marL="0" indent="0">
+              <a:buNone/>
+            </a:pPr>
+            <a:r>
+              <a:rPr lang="en-US" dirty="0" err="1">
+                <a:solidFill>
+                  <a:srgbClr val="DCDCAA"/>
+                </a:solidFill>
+                <a:latin typeface="Consolas" panose="020B0609020204030204" pitchFamily="49" charset="0"/>
+              </a:rPr>
+              <a:t>getUncompletedToDos</a:t>
+            </a:r>
+            <a:r>
+              <a:rPr lang="en-US" dirty="0">
+                <a:solidFill>
+                  <a:srgbClr val="D4D4D4"/>
+                </a:solidFill>
+                <a:latin typeface="Consolas" panose="020B0609020204030204" pitchFamily="49" charset="0"/>
+              </a:rPr>
+              <a:t>() {</a:t>
+            </a:r>
+          </a:p>
+          <a:p>
+            <a:pPr marL="0" indent="0">
+              <a:buNone/>
+            </a:pPr>
+            <a:r>
+              <a:rPr lang="en-US" dirty="0">
+                <a:solidFill>
+                  <a:srgbClr val="569CD6"/>
+                </a:solidFill>
+                <a:latin typeface="Consolas" panose="020B0609020204030204" pitchFamily="49" charset="0"/>
+              </a:rPr>
+              <a:t>	</a:t>
+            </a:r>
+            <a:r>
+              <a:rPr lang="en-US" dirty="0" err="1">
+                <a:solidFill>
+                  <a:srgbClr val="569CD6"/>
+                </a:solidFill>
+                <a:latin typeface="Consolas" panose="020B0609020204030204" pitchFamily="49" charset="0"/>
+              </a:rPr>
+              <a:t>this</a:t>
+            </a:r>
+            <a:r>
+              <a:rPr lang="en-US" dirty="0" err="1">
+                <a:solidFill>
+                  <a:srgbClr val="D4D4D4"/>
+                </a:solidFill>
+                <a:latin typeface="Consolas" panose="020B0609020204030204" pitchFamily="49" charset="0"/>
+              </a:rPr>
+              <a:t>.</a:t>
+            </a:r>
+            <a:r>
+              <a:rPr lang="en-US" dirty="0" err="1">
+                <a:solidFill>
+                  <a:srgbClr val="9CDCFE"/>
+                </a:solidFill>
+                <a:latin typeface="Consolas" panose="020B0609020204030204" pitchFamily="49" charset="0"/>
+              </a:rPr>
+              <a:t>todoService</a:t>
+            </a:r>
+            <a:r>
+              <a:rPr lang="en-US" dirty="0" err="1">
+                <a:solidFill>
+                  <a:srgbClr val="D4D4D4"/>
+                </a:solidFill>
+                <a:latin typeface="Consolas" panose="020B0609020204030204" pitchFamily="49" charset="0"/>
+              </a:rPr>
+              <a:t>.</a:t>
+            </a:r>
+            <a:r>
+              <a:rPr lang="en-US" dirty="0" err="1">
+                <a:solidFill>
+                  <a:srgbClr val="DCDCAA"/>
+                </a:solidFill>
+                <a:latin typeface="Consolas" panose="020B0609020204030204" pitchFamily="49" charset="0"/>
+              </a:rPr>
+              <a:t>getCompletedToDos</a:t>
+            </a:r>
+            <a:r>
+              <a:rPr lang="en-US" dirty="0">
+                <a:solidFill>
+                  <a:srgbClr val="D4D4D4"/>
+                </a:solidFill>
+                <a:latin typeface="Consolas" panose="020B0609020204030204" pitchFamily="49" charset="0"/>
+              </a:rPr>
+              <a:t>().</a:t>
+            </a:r>
+            <a:r>
+              <a:rPr lang="en-US" dirty="0">
+                <a:solidFill>
+                  <a:srgbClr val="DCDCAA"/>
+                </a:solidFill>
+                <a:latin typeface="Consolas" panose="020B0609020204030204" pitchFamily="49" charset="0"/>
+              </a:rPr>
+              <a:t>subscribe</a:t>
+            </a:r>
+            <a:r>
+              <a:rPr lang="en-US" dirty="0">
+                <a:solidFill>
+                  <a:srgbClr val="D4D4D4"/>
+                </a:solidFill>
+                <a:latin typeface="Consolas" panose="020B0609020204030204" pitchFamily="49" charset="0"/>
+              </a:rPr>
+              <a:t>(</a:t>
+            </a:r>
+          </a:p>
+          <a:p>
+            <a:pPr marL="0" indent="0">
+              <a:buNone/>
+            </a:pPr>
+            <a:r>
+              <a:rPr lang="en-US" dirty="0">
+                <a:solidFill>
+                  <a:srgbClr val="9CDCFE"/>
+                </a:solidFill>
+                <a:latin typeface="Consolas" panose="020B0609020204030204" pitchFamily="49" charset="0"/>
+              </a:rPr>
+              <a:t>		data</a:t>
+            </a:r>
+            <a:r>
+              <a:rPr lang="en-US" dirty="0">
+                <a:solidFill>
+                  <a:srgbClr val="D4D4D4"/>
+                </a:solidFill>
+                <a:latin typeface="Consolas" panose="020B0609020204030204" pitchFamily="49" charset="0"/>
+              </a:rPr>
+              <a:t> </a:t>
+            </a:r>
+            <a:r>
+              <a:rPr lang="en-US" dirty="0">
+                <a:solidFill>
+                  <a:srgbClr val="569CD6"/>
+                </a:solidFill>
+                <a:latin typeface="Consolas" panose="020B0609020204030204" pitchFamily="49" charset="0"/>
+              </a:rPr>
+              <a:t>=&gt;</a:t>
+            </a:r>
+            <a:r>
+              <a:rPr lang="en-US" dirty="0">
+                <a:solidFill>
+                  <a:srgbClr val="D4D4D4"/>
+                </a:solidFill>
+                <a:latin typeface="Consolas" panose="020B0609020204030204" pitchFamily="49" charset="0"/>
+              </a:rPr>
+              <a:t> {</a:t>
+            </a:r>
+          </a:p>
+          <a:p>
+            <a:pPr marL="0" indent="0">
+              <a:buNone/>
+            </a:pPr>
+            <a:r>
+              <a:rPr lang="en-US" dirty="0">
+                <a:solidFill>
+                  <a:srgbClr val="569CD6"/>
+                </a:solidFill>
+                <a:latin typeface="Consolas" panose="020B0609020204030204" pitchFamily="49" charset="0"/>
+              </a:rPr>
+              <a:t>			</a:t>
+            </a:r>
+            <a:r>
+              <a:rPr lang="en-US" dirty="0" err="1">
+                <a:solidFill>
+                  <a:srgbClr val="569CD6"/>
+                </a:solidFill>
+                <a:latin typeface="Consolas" panose="020B0609020204030204" pitchFamily="49" charset="0"/>
+              </a:rPr>
+              <a:t>this</a:t>
+            </a:r>
+            <a:r>
+              <a:rPr lang="en-US" dirty="0" err="1">
+                <a:solidFill>
+                  <a:srgbClr val="D4D4D4"/>
+                </a:solidFill>
+                <a:latin typeface="Consolas" panose="020B0609020204030204" pitchFamily="49" charset="0"/>
+              </a:rPr>
+              <a:t>.</a:t>
+            </a:r>
+            <a:r>
+              <a:rPr lang="en-US" dirty="0" err="1">
+                <a:solidFill>
+                  <a:srgbClr val="9CDCFE"/>
+                </a:solidFill>
+                <a:latin typeface="Consolas" panose="020B0609020204030204" pitchFamily="49" charset="0"/>
+              </a:rPr>
+              <a:t>todos</a:t>
+            </a:r>
+            <a:r>
+              <a:rPr lang="en-US" dirty="0">
+                <a:solidFill>
+                  <a:srgbClr val="D4D4D4"/>
+                </a:solidFill>
+                <a:latin typeface="Consolas" panose="020B0609020204030204" pitchFamily="49" charset="0"/>
+              </a:rPr>
+              <a:t> = </a:t>
+            </a:r>
+            <a:r>
+              <a:rPr lang="en-US" dirty="0">
+                <a:solidFill>
+                  <a:srgbClr val="9CDCFE"/>
+                </a:solidFill>
+                <a:latin typeface="Consolas" panose="020B0609020204030204" pitchFamily="49" charset="0"/>
+              </a:rPr>
+              <a:t>data</a:t>
+            </a:r>
+            <a:r>
+              <a:rPr lang="en-US" dirty="0">
+                <a:solidFill>
+                  <a:srgbClr val="D4D4D4"/>
+                </a:solidFill>
+                <a:latin typeface="Consolas" panose="020B0609020204030204" pitchFamily="49" charset="0"/>
+              </a:rPr>
+              <a:t>;</a:t>
+            </a:r>
+          </a:p>
+          <a:p>
+            <a:pPr marL="0" indent="0">
+              <a:buNone/>
+            </a:pPr>
+            <a:r>
+              <a:rPr lang="en-US" dirty="0">
+                <a:solidFill>
+                  <a:srgbClr val="D4D4D4"/>
+                </a:solidFill>
+                <a:latin typeface="Consolas" panose="020B0609020204030204" pitchFamily="49" charset="0"/>
+              </a:rPr>
+              <a:t>		},</a:t>
+            </a:r>
+          </a:p>
+          <a:p>
+            <a:pPr marL="0" indent="0">
+              <a:buNone/>
+            </a:pPr>
+            <a:r>
+              <a:rPr lang="en-US" dirty="0">
+                <a:solidFill>
+                  <a:srgbClr val="9CDCFE"/>
+                </a:solidFill>
+                <a:latin typeface="Consolas" panose="020B0609020204030204" pitchFamily="49" charset="0"/>
+              </a:rPr>
+              <a:t>		err</a:t>
+            </a:r>
+            <a:r>
+              <a:rPr lang="en-US" dirty="0">
+                <a:solidFill>
+                  <a:srgbClr val="D4D4D4"/>
+                </a:solidFill>
+                <a:latin typeface="Consolas" panose="020B0609020204030204" pitchFamily="49" charset="0"/>
+              </a:rPr>
+              <a:t> </a:t>
+            </a:r>
+            <a:r>
+              <a:rPr lang="en-US" dirty="0">
+                <a:solidFill>
+                  <a:srgbClr val="569CD6"/>
+                </a:solidFill>
+                <a:latin typeface="Consolas" panose="020B0609020204030204" pitchFamily="49" charset="0"/>
+              </a:rPr>
+              <a:t>=&gt;</a:t>
+            </a:r>
+            <a:r>
+              <a:rPr lang="en-US" dirty="0">
+                <a:solidFill>
+                  <a:srgbClr val="D4D4D4"/>
+                </a:solidFill>
+                <a:latin typeface="Consolas" panose="020B0609020204030204" pitchFamily="49" charset="0"/>
+              </a:rPr>
+              <a:t> {</a:t>
+            </a:r>
+          </a:p>
+          <a:p>
+            <a:pPr marL="0" indent="0">
+              <a:buNone/>
+            </a:pPr>
+            <a:r>
+              <a:rPr lang="en-US" dirty="0">
+                <a:solidFill>
+                  <a:srgbClr val="DCDCAA"/>
+                </a:solidFill>
+                <a:latin typeface="Consolas" panose="020B0609020204030204" pitchFamily="49" charset="0"/>
+              </a:rPr>
+              <a:t>			alert</a:t>
+            </a:r>
+            <a:r>
+              <a:rPr lang="en-US" dirty="0">
+                <a:solidFill>
+                  <a:srgbClr val="D4D4D4"/>
+                </a:solidFill>
+                <a:latin typeface="Consolas" panose="020B0609020204030204" pitchFamily="49" charset="0"/>
+              </a:rPr>
+              <a:t>(</a:t>
+            </a:r>
+            <a:r>
+              <a:rPr lang="en-US" dirty="0">
+                <a:solidFill>
+                  <a:srgbClr val="CE9178"/>
+                </a:solidFill>
+                <a:latin typeface="Consolas" panose="020B0609020204030204" pitchFamily="49" charset="0"/>
+              </a:rPr>
+              <a:t>'Something went wrong!’</a:t>
+            </a:r>
+            <a:r>
+              <a:rPr lang="en-US" dirty="0">
+                <a:solidFill>
+                  <a:srgbClr val="D4D4D4"/>
+                </a:solidFill>
+                <a:latin typeface="Consolas" panose="020B0609020204030204" pitchFamily="49" charset="0"/>
+              </a:rPr>
+              <a:t>);</a:t>
+            </a:r>
+          </a:p>
+          <a:p>
+            <a:pPr marL="0" indent="0">
+              <a:buNone/>
+            </a:pPr>
+            <a:r>
+              <a:rPr lang="en-US" dirty="0">
+                <a:solidFill>
+                  <a:srgbClr val="D4D4D4"/>
+                </a:solidFill>
+                <a:latin typeface="Consolas" panose="020B0609020204030204" pitchFamily="49" charset="0"/>
+              </a:rPr>
+              <a:t>		}</a:t>
+            </a:r>
+          </a:p>
+          <a:p>
+            <a:pPr marL="0" indent="0">
+              <a:buNone/>
+            </a:pPr>
+            <a:r>
+              <a:rPr lang="en-US" dirty="0">
+                <a:solidFill>
+                  <a:srgbClr val="D4D4D4"/>
+                </a:solidFill>
+                <a:latin typeface="Consolas" panose="020B0609020204030204" pitchFamily="49" charset="0"/>
+              </a:rPr>
+              <a:t>	);</a:t>
+            </a:r>
+          </a:p>
+          <a:p>
+            <a:pPr marL="0" indent="0">
+              <a:buNone/>
+            </a:pPr>
+            <a:r>
+              <a:rPr lang="en-US" dirty="0">
+                <a:solidFill>
+                  <a:srgbClr val="D4D4D4"/>
+                </a:solidFill>
+                <a:latin typeface="Consolas" panose="020B0609020204030204" pitchFamily="49" charset="0"/>
+              </a:rPr>
+              <a:t>}</a:t>
+            </a:r>
+          </a:p>
+        </p:txBody>
+      </p:sp>
+    </p:spTree>
+    <p:extLst>
+      <p:ext uri="{BB962C8B-B14F-4D97-AF65-F5344CB8AC3E}">
+        <p14:creationId xmlns:p14="http://schemas.microsoft.com/office/powerpoint/2010/main" val="897541566"/>
+      </p:ext>
+    </p:extLst>
+  </p:cSld>
+  <p:clrMapOvr>
+    <a:masterClrMapping/>
+  </p:clrMapOvr>
+</p:sld>
+</file>
+
+<file path=ppt/slides/slide65.xml><?xml version="1.0" encoding="utf-8"?>
+<p:sld xmlns:a="http://schemas.openxmlformats.org/drawingml/2006/main" xmlns:r="http://schemas.openxmlformats.org/officeDocument/2006/relationships" xmlns:p="http://schemas.openxmlformats.org/presentationml/2006/main">
+  <p:cSld>
+    <p:spTree>
+      <p:nvGrpSpPr>
+        <p:cNvPr id="1" name=""/>
+        <p:cNvGrpSpPr/>
+        <p:nvPr/>
+      </p:nvGrpSpPr>
+      <p:grpSpPr>
+        <a:xfrm>
+          <a:off x="0" y="0"/>
+          <a:ext cx="0" cy="0"/>
+          <a:chOff x="0" y="0"/>
+          <a:chExt cx="0" cy="0"/>
+        </a:xfrm>
+      </p:grpSpPr>
+      <p:sp>
+        <p:nvSpPr>
+          <p:cNvPr id="2" name="Title 1">
+            <a:extLst>
+              <a:ext uri="{FF2B5EF4-FFF2-40B4-BE49-F238E27FC236}">
+                <a16:creationId xmlns:a16="http://schemas.microsoft.com/office/drawing/2014/main" id="{49502040-4BD4-4896-9E9F-012F6134EEA6}"/>
+              </a:ext>
+            </a:extLst>
+          </p:cNvPr>
+          <p:cNvSpPr>
+            <a:spLocks noGrp="1"/>
+          </p:cNvSpPr>
+          <p:nvPr>
+            <p:ph type="title"/>
+          </p:nvPr>
+        </p:nvSpPr>
+        <p:spPr/>
+        <p:txBody>
+          <a:bodyPr/>
+          <a:lstStyle/>
+          <a:p>
+            <a:r>
+              <a:rPr lang="en-US" dirty="0"/>
+              <a:t>todo-overview.component.html</a:t>
+            </a:r>
+            <a:endParaRPr lang="en-NL" dirty="0"/>
+          </a:p>
+        </p:txBody>
+      </p:sp>
+      <p:sp>
+        <p:nvSpPr>
+          <p:cNvPr id="3" name="Content Placeholder 2">
+            <a:extLst>
+              <a:ext uri="{FF2B5EF4-FFF2-40B4-BE49-F238E27FC236}">
+                <a16:creationId xmlns:a16="http://schemas.microsoft.com/office/drawing/2014/main" id="{88DCACBD-95E1-403E-951F-A8E9650D918B}"/>
+              </a:ext>
+            </a:extLst>
+          </p:cNvPr>
+          <p:cNvSpPr>
+            <a:spLocks noGrp="1"/>
+          </p:cNvSpPr>
+          <p:nvPr>
+            <p:ph idx="1"/>
+          </p:nvPr>
+        </p:nvSpPr>
+        <p:spPr/>
+        <p:style>
+          <a:lnRef idx="0">
+            <a:scrgbClr r="0" g="0" b="0"/>
+          </a:lnRef>
+          <a:fillRef idx="1001">
+            <a:schemeClr val="dk2"/>
+          </a:fillRef>
+          <a:effectRef idx="0">
+            <a:scrgbClr r="0" g="0" b="0"/>
+          </a:effectRef>
+          <a:fontRef idx="major"/>
+        </p:style>
+        <p:txBody>
+          <a:bodyPr/>
+          <a:lstStyle/>
+          <a:p>
+            <a:pPr marL="0" indent="0">
+              <a:buNone/>
+            </a:pPr>
+            <a:r>
+              <a:rPr lang="en-US" dirty="0">
+                <a:solidFill>
+                  <a:srgbClr val="808080"/>
+                </a:solidFill>
+                <a:latin typeface="Consolas" panose="020B0609020204030204" pitchFamily="49" charset="0"/>
+              </a:rPr>
+              <a:t>&lt;</a:t>
+            </a:r>
+            <a:r>
+              <a:rPr lang="en-US" dirty="0">
+                <a:solidFill>
+                  <a:srgbClr val="569CD6"/>
+                </a:solidFill>
+                <a:latin typeface="Consolas" panose="020B0609020204030204" pitchFamily="49" charset="0"/>
+              </a:rPr>
+              <a:t>h1</a:t>
+            </a:r>
+            <a:r>
+              <a:rPr lang="en-US" dirty="0">
+                <a:solidFill>
+                  <a:srgbClr val="808080"/>
+                </a:solidFill>
+                <a:latin typeface="Consolas" panose="020B0609020204030204" pitchFamily="49" charset="0"/>
+              </a:rPr>
+              <a:t>&gt;</a:t>
+            </a:r>
+            <a:r>
+              <a:rPr lang="en-US" dirty="0">
+                <a:solidFill>
+                  <a:srgbClr val="D4D4D4"/>
+                </a:solidFill>
+                <a:latin typeface="Consolas" panose="020B0609020204030204" pitchFamily="49" charset="0"/>
+              </a:rPr>
+              <a:t>{{header}}</a:t>
+            </a:r>
+            <a:r>
+              <a:rPr lang="en-US" dirty="0">
+                <a:solidFill>
+                  <a:srgbClr val="808080"/>
+                </a:solidFill>
+                <a:latin typeface="Consolas" panose="020B0609020204030204" pitchFamily="49" charset="0"/>
+              </a:rPr>
+              <a:t>&lt;/</a:t>
+            </a:r>
+            <a:r>
+              <a:rPr lang="en-US" dirty="0">
+                <a:solidFill>
+                  <a:srgbClr val="569CD6"/>
+                </a:solidFill>
+                <a:latin typeface="Consolas" panose="020B0609020204030204" pitchFamily="49" charset="0"/>
+              </a:rPr>
+              <a:t>h1</a:t>
+            </a:r>
+            <a:r>
+              <a:rPr lang="en-US" dirty="0">
+                <a:solidFill>
+                  <a:srgbClr val="808080"/>
+                </a:solidFill>
+                <a:latin typeface="Consolas" panose="020B0609020204030204" pitchFamily="49" charset="0"/>
+              </a:rPr>
+              <a:t>&gt;</a:t>
+            </a:r>
+            <a:endParaRPr lang="en-US" dirty="0">
+              <a:solidFill>
+                <a:srgbClr val="D4D4D4"/>
+              </a:solidFill>
+              <a:latin typeface="Consolas" panose="020B0609020204030204" pitchFamily="49" charset="0"/>
+            </a:endParaRPr>
+          </a:p>
+          <a:p>
+            <a:pPr marL="0" indent="0">
+              <a:buNone/>
+            </a:pPr>
+            <a:endParaRPr lang="en-NL" dirty="0"/>
+          </a:p>
+        </p:txBody>
+      </p:sp>
+    </p:spTree>
+    <p:extLst>
+      <p:ext uri="{BB962C8B-B14F-4D97-AF65-F5344CB8AC3E}">
+        <p14:creationId xmlns:p14="http://schemas.microsoft.com/office/powerpoint/2010/main" val="4245896863"/>
       </p:ext>
     </p:extLst>
   </p:cSld>

</xml_diff>